<commit_message>
Presentation changes and tab change in the TGraph
</commit_message>
<xml_diff>
--- a/Presentation.pptx
+++ b/Presentation.pptx
@@ -14,7 +14,8 @@
     <p:sldId id="262" r:id="rId8"/>
     <p:sldId id="263" r:id="rId9"/>
     <p:sldId id="264" r:id="rId10"/>
-    <p:sldId id="265" r:id="rId11"/>
+    <p:sldId id="266" r:id="rId11"/>
+    <p:sldId id="265" r:id="rId12"/>
   </p:sldIdLst>
   <p:sldSz cx="12192000" cy="6858000"/>
   <p:notesSz cx="6858000" cy="9144000"/>
@@ -113,6 +114,11 @@
       </a:defRPr>
     </a:lvl9pPr>
   </p:defaultTextStyle>
+  <p:extLst>
+    <p:ext uri="{EFAFB233-063F-42B5-8137-9DF3F51BA10A}">
+      <p15:sldGuideLst xmlns:p15="http://schemas.microsoft.com/office/powerpoint/2012/main"/>
+    </p:ext>
+  </p:extLst>
 </p:presentation>
 </file>
 
@@ -210,7 +216,7 @@
           </a:lstStyle>
           <a:p>
             <a:r>
-              <a:rPr lang="it-IT" smtClean="0"/>
+              <a:rPr lang="it-IT"/>
               <a:t>Fare clic per modificare lo stile del titolo</a:t>
             </a:r>
             <a:endParaRPr lang="en-US" dirty="0"/>
@@ -282,7 +288,7 @@
           </a:lstStyle>
           <a:p>
             <a:r>
-              <a:rPr lang="it-IT" smtClean="0"/>
+              <a:rPr lang="it-IT"/>
               <a:t>Fare clic per modificare lo stile del sottotitolo dello schema</a:t>
             </a:r>
             <a:endParaRPr lang="en-US" dirty="0"/>
@@ -316,7 +322,7 @@
           <a:p>
             <a:fld id="{550838AA-B79A-4B3D-A000-978E2F12FD83}" type="datetimeFigureOut">
               <a:rPr lang="en-US" smtClean="0"/>
-              <a:t>2/21/2024</a:t>
+              <a:t>2/21/24</a:t>
             </a:fld>
             <a:endParaRPr lang="en-US"/>
           </a:p>
@@ -378,7 +384,7 @@
           <a:p>
             <a:fld id="{ABE17D80-2DC1-4B61-A42F-CD3D496E699C}" type="slidenum">
               <a:rPr lang="en-US" smtClean="0"/>
-              <a:t>‹N›</a:t>
+              <a:t>‹#›</a:t>
             </a:fld>
             <a:endParaRPr lang="en-US"/>
           </a:p>
@@ -430,7 +436,7 @@
           <a:lstStyle/>
           <a:p>
             <a:r>
-              <a:rPr lang="it-IT" smtClean="0"/>
+              <a:rPr lang="it-IT"/>
               <a:t>Fare clic per modificare lo stile del titolo</a:t>
             </a:r>
             <a:endParaRPr lang="en-US" dirty="0"/>
@@ -454,35 +460,35 @@
           <a:p>
             <a:pPr lvl="0"/>
             <a:r>
-              <a:rPr lang="it-IT" smtClean="0"/>
+              <a:rPr lang="it-IT"/>
               <a:t>Modifica gli stili del testo dello schema</a:t>
             </a:r>
           </a:p>
           <a:p>
             <a:pPr lvl="1"/>
             <a:r>
-              <a:rPr lang="it-IT" smtClean="0"/>
+              <a:rPr lang="it-IT"/>
               <a:t>Secondo livello</a:t>
             </a:r>
           </a:p>
           <a:p>
             <a:pPr lvl="2"/>
             <a:r>
-              <a:rPr lang="it-IT" smtClean="0"/>
+              <a:rPr lang="it-IT"/>
               <a:t>Terzo livello</a:t>
             </a:r>
           </a:p>
           <a:p>
             <a:pPr lvl="3"/>
             <a:r>
-              <a:rPr lang="it-IT" smtClean="0"/>
+              <a:rPr lang="it-IT"/>
               <a:t>Quarto livello</a:t>
             </a:r>
           </a:p>
           <a:p>
             <a:pPr lvl="4"/>
             <a:r>
-              <a:rPr lang="it-IT" smtClean="0"/>
+              <a:rPr lang="it-IT"/>
               <a:t>Quinto livello</a:t>
             </a:r>
             <a:endParaRPr lang="en-US" dirty="0"/>
@@ -506,7 +512,7 @@
           <a:p>
             <a:fld id="{550838AA-B79A-4B3D-A000-978E2F12FD83}" type="datetimeFigureOut">
               <a:rPr lang="en-US" smtClean="0"/>
-              <a:t>2/21/2024</a:t>
+              <a:t>2/21/24</a:t>
             </a:fld>
             <a:endParaRPr lang="en-US"/>
           </a:p>
@@ -548,7 +554,7 @@
           <a:p>
             <a:fld id="{ABE17D80-2DC1-4B61-A42F-CD3D496E699C}" type="slidenum">
               <a:rPr lang="en-US" smtClean="0"/>
-              <a:t>‹N›</a:t>
+              <a:t>‹#›</a:t>
             </a:fld>
             <a:endParaRPr lang="en-US"/>
           </a:p>
@@ -605,7 +611,7 @@
           <a:lstStyle/>
           <a:p>
             <a:r>
-              <a:rPr lang="it-IT" smtClean="0"/>
+              <a:rPr lang="it-IT"/>
               <a:t>Fare clic per modificare lo stile del titolo</a:t>
             </a:r>
             <a:endParaRPr lang="en-US" dirty="0"/>
@@ -634,35 +640,35 @@
           <a:p>
             <a:pPr lvl="0"/>
             <a:r>
-              <a:rPr lang="it-IT" smtClean="0"/>
+              <a:rPr lang="it-IT"/>
               <a:t>Modifica gli stili del testo dello schema</a:t>
             </a:r>
           </a:p>
           <a:p>
             <a:pPr lvl="1"/>
             <a:r>
-              <a:rPr lang="it-IT" smtClean="0"/>
+              <a:rPr lang="it-IT"/>
               <a:t>Secondo livello</a:t>
             </a:r>
           </a:p>
           <a:p>
             <a:pPr lvl="2"/>
             <a:r>
-              <a:rPr lang="it-IT" smtClean="0"/>
+              <a:rPr lang="it-IT"/>
               <a:t>Terzo livello</a:t>
             </a:r>
           </a:p>
           <a:p>
             <a:pPr lvl="3"/>
             <a:r>
-              <a:rPr lang="it-IT" smtClean="0"/>
+              <a:rPr lang="it-IT"/>
               <a:t>Quarto livello</a:t>
             </a:r>
           </a:p>
           <a:p>
             <a:pPr lvl="4"/>
             <a:r>
-              <a:rPr lang="it-IT" smtClean="0"/>
+              <a:rPr lang="it-IT"/>
               <a:t>Quinto livello</a:t>
             </a:r>
             <a:endParaRPr lang="en-US" dirty="0"/>
@@ -686,7 +692,7 @@
           <a:p>
             <a:fld id="{550838AA-B79A-4B3D-A000-978E2F12FD83}" type="datetimeFigureOut">
               <a:rPr lang="en-US" smtClean="0"/>
-              <a:t>2/21/2024</a:t>
+              <a:t>2/21/24</a:t>
             </a:fld>
             <a:endParaRPr lang="en-US"/>
           </a:p>
@@ -728,7 +734,7 @@
           <a:p>
             <a:fld id="{ABE17D80-2DC1-4B61-A42F-CD3D496E699C}" type="slidenum">
               <a:rPr lang="en-US" smtClean="0"/>
-              <a:t>‹N›</a:t>
+              <a:t>‹#›</a:t>
             </a:fld>
             <a:endParaRPr lang="en-US"/>
           </a:p>
@@ -780,7 +786,7 @@
           <a:lstStyle/>
           <a:p>
             <a:r>
-              <a:rPr lang="it-IT" smtClean="0"/>
+              <a:rPr lang="it-IT"/>
               <a:t>Fare clic per modificare lo stile del titolo</a:t>
             </a:r>
             <a:endParaRPr lang="en-US" dirty="0"/>
@@ -804,35 +810,35 @@
           <a:p>
             <a:pPr lvl="0"/>
             <a:r>
-              <a:rPr lang="it-IT" smtClean="0"/>
+              <a:rPr lang="it-IT"/>
               <a:t>Modifica gli stili del testo dello schema</a:t>
             </a:r>
           </a:p>
           <a:p>
             <a:pPr lvl="1"/>
             <a:r>
-              <a:rPr lang="it-IT" smtClean="0"/>
+              <a:rPr lang="it-IT"/>
               <a:t>Secondo livello</a:t>
             </a:r>
           </a:p>
           <a:p>
             <a:pPr lvl="2"/>
             <a:r>
-              <a:rPr lang="it-IT" smtClean="0"/>
+              <a:rPr lang="it-IT"/>
               <a:t>Terzo livello</a:t>
             </a:r>
           </a:p>
           <a:p>
             <a:pPr lvl="3"/>
             <a:r>
-              <a:rPr lang="it-IT" smtClean="0"/>
+              <a:rPr lang="it-IT"/>
               <a:t>Quarto livello</a:t>
             </a:r>
           </a:p>
           <a:p>
             <a:pPr lvl="4"/>
             <a:r>
-              <a:rPr lang="it-IT" smtClean="0"/>
+              <a:rPr lang="it-IT"/>
               <a:t>Quinto livello</a:t>
             </a:r>
             <a:endParaRPr lang="en-US" dirty="0"/>
@@ -856,7 +862,7 @@
           <a:p>
             <a:fld id="{550838AA-B79A-4B3D-A000-978E2F12FD83}" type="datetimeFigureOut">
               <a:rPr lang="en-US" smtClean="0"/>
-              <a:t>2/21/2024</a:t>
+              <a:t>2/21/24</a:t>
             </a:fld>
             <a:endParaRPr lang="en-US"/>
           </a:p>
@@ -898,7 +904,7 @@
           <a:p>
             <a:fld id="{ABE17D80-2DC1-4B61-A42F-CD3D496E699C}" type="slidenum">
               <a:rPr lang="en-US" smtClean="0"/>
-              <a:t>‹N›</a:t>
+              <a:t>‹#›</a:t>
             </a:fld>
             <a:endParaRPr lang="en-US"/>
           </a:p>
@@ -968,7 +974,7 @@
           </a:lstStyle>
           <a:p>
             <a:r>
-              <a:rPr lang="it-IT" smtClean="0"/>
+              <a:rPr lang="it-IT"/>
               <a:t>Fare clic per modificare lo stile del titolo</a:t>
             </a:r>
             <a:endParaRPr lang="en-US" dirty="0"/>
@@ -1089,7 +1095,7 @@
           <a:p>
             <a:pPr lvl="0"/>
             <a:r>
-              <a:rPr lang="it-IT" smtClean="0"/>
+              <a:rPr lang="it-IT"/>
               <a:t>Modifica gli stili del testo dello schema</a:t>
             </a:r>
           </a:p>
@@ -1112,7 +1118,7 @@
           <a:p>
             <a:fld id="{550838AA-B79A-4B3D-A000-978E2F12FD83}" type="datetimeFigureOut">
               <a:rPr lang="en-US" smtClean="0"/>
-              <a:t>2/21/2024</a:t>
+              <a:t>2/21/24</a:t>
             </a:fld>
             <a:endParaRPr lang="en-US"/>
           </a:p>
@@ -1154,7 +1160,7 @@
           <a:p>
             <a:fld id="{ABE17D80-2DC1-4B61-A42F-CD3D496E699C}" type="slidenum">
               <a:rPr lang="en-US" smtClean="0"/>
-              <a:t>‹N›</a:t>
+              <a:t>‹#›</a:t>
             </a:fld>
             <a:endParaRPr lang="en-US"/>
           </a:p>
@@ -1206,7 +1212,7 @@
           <a:lstStyle/>
           <a:p>
             <a:r>
-              <a:rPr lang="it-IT" smtClean="0"/>
+              <a:rPr lang="it-IT"/>
               <a:t>Fare clic per modificare lo stile del titolo</a:t>
             </a:r>
             <a:endParaRPr lang="en-US" dirty="0"/>
@@ -1263,35 +1269,35 @@
           <a:p>
             <a:pPr lvl="0"/>
             <a:r>
-              <a:rPr lang="it-IT" smtClean="0"/>
+              <a:rPr lang="it-IT"/>
               <a:t>Modifica gli stili del testo dello schema</a:t>
             </a:r>
           </a:p>
           <a:p>
             <a:pPr lvl="1"/>
             <a:r>
-              <a:rPr lang="it-IT" smtClean="0"/>
+              <a:rPr lang="it-IT"/>
               <a:t>Secondo livello</a:t>
             </a:r>
           </a:p>
           <a:p>
             <a:pPr lvl="2"/>
             <a:r>
-              <a:rPr lang="it-IT" smtClean="0"/>
+              <a:rPr lang="it-IT"/>
               <a:t>Terzo livello</a:t>
             </a:r>
           </a:p>
           <a:p>
             <a:pPr lvl="3"/>
             <a:r>
-              <a:rPr lang="it-IT" smtClean="0"/>
+              <a:rPr lang="it-IT"/>
               <a:t>Quarto livello</a:t>
             </a:r>
           </a:p>
           <a:p>
             <a:pPr lvl="4"/>
             <a:r>
-              <a:rPr lang="it-IT" smtClean="0"/>
+              <a:rPr lang="it-IT"/>
               <a:t>Quinto livello</a:t>
             </a:r>
             <a:endParaRPr lang="en-US" dirty="0"/>
@@ -1348,35 +1354,35 @@
           <a:p>
             <a:pPr lvl="0"/>
             <a:r>
-              <a:rPr lang="it-IT" smtClean="0"/>
+              <a:rPr lang="it-IT"/>
               <a:t>Modifica gli stili del testo dello schema</a:t>
             </a:r>
           </a:p>
           <a:p>
             <a:pPr lvl="1"/>
             <a:r>
-              <a:rPr lang="it-IT" smtClean="0"/>
+              <a:rPr lang="it-IT"/>
               <a:t>Secondo livello</a:t>
             </a:r>
           </a:p>
           <a:p>
             <a:pPr lvl="2"/>
             <a:r>
-              <a:rPr lang="it-IT" smtClean="0"/>
+              <a:rPr lang="it-IT"/>
               <a:t>Terzo livello</a:t>
             </a:r>
           </a:p>
           <a:p>
             <a:pPr lvl="3"/>
             <a:r>
-              <a:rPr lang="it-IT" smtClean="0"/>
+              <a:rPr lang="it-IT"/>
               <a:t>Quarto livello</a:t>
             </a:r>
           </a:p>
           <a:p>
             <a:pPr lvl="4"/>
             <a:r>
-              <a:rPr lang="it-IT" smtClean="0"/>
+              <a:rPr lang="it-IT"/>
               <a:t>Quinto livello</a:t>
             </a:r>
             <a:endParaRPr lang="en-US" dirty="0"/>
@@ -1400,7 +1406,7 @@
           <a:p>
             <a:fld id="{550838AA-B79A-4B3D-A000-978E2F12FD83}" type="datetimeFigureOut">
               <a:rPr lang="en-US" smtClean="0"/>
-              <a:t>2/21/2024</a:t>
+              <a:t>2/21/24</a:t>
             </a:fld>
             <a:endParaRPr lang="en-US"/>
           </a:p>
@@ -1442,7 +1448,7 @@
           <a:p>
             <a:fld id="{ABE17D80-2DC1-4B61-A42F-CD3D496E699C}" type="slidenum">
               <a:rPr lang="en-US" smtClean="0"/>
-              <a:t>‹N›</a:t>
+              <a:t>‹#›</a:t>
             </a:fld>
             <a:endParaRPr lang="en-US"/>
           </a:p>
@@ -1494,7 +1500,7 @@
           <a:lstStyle/>
           <a:p>
             <a:r>
-              <a:rPr lang="it-IT" smtClean="0"/>
+              <a:rPr lang="it-IT"/>
               <a:t>Fare clic per modificare lo stile del titolo</a:t>
             </a:r>
             <a:endParaRPr lang="en-US" dirty="0"/>
@@ -1570,7 +1576,7 @@
           <a:p>
             <a:pPr lvl="0"/>
             <a:r>
-              <a:rPr lang="it-IT" smtClean="0"/>
+              <a:rPr lang="it-IT"/>
               <a:t>Modifica gli stili del testo dello schema</a:t>
             </a:r>
           </a:p>
@@ -1626,35 +1632,35 @@
           <a:p>
             <a:pPr lvl="0"/>
             <a:r>
-              <a:rPr lang="it-IT" smtClean="0"/>
+              <a:rPr lang="it-IT"/>
               <a:t>Modifica gli stili del testo dello schema</a:t>
             </a:r>
           </a:p>
           <a:p>
             <a:pPr lvl="1"/>
             <a:r>
-              <a:rPr lang="it-IT" smtClean="0"/>
+              <a:rPr lang="it-IT"/>
               <a:t>Secondo livello</a:t>
             </a:r>
           </a:p>
           <a:p>
             <a:pPr lvl="2"/>
             <a:r>
-              <a:rPr lang="it-IT" smtClean="0"/>
+              <a:rPr lang="it-IT"/>
               <a:t>Terzo livello</a:t>
             </a:r>
           </a:p>
           <a:p>
             <a:pPr lvl="3"/>
             <a:r>
-              <a:rPr lang="it-IT" smtClean="0"/>
+              <a:rPr lang="it-IT"/>
               <a:t>Quarto livello</a:t>
             </a:r>
           </a:p>
           <a:p>
             <a:pPr lvl="4"/>
             <a:r>
-              <a:rPr lang="it-IT" smtClean="0"/>
+              <a:rPr lang="it-IT"/>
               <a:t>Quinto livello</a:t>
             </a:r>
             <a:endParaRPr lang="en-US" dirty="0"/>
@@ -1730,7 +1736,7 @@
           <a:p>
             <a:pPr lvl="0"/>
             <a:r>
-              <a:rPr lang="it-IT" smtClean="0"/>
+              <a:rPr lang="it-IT"/>
               <a:t>Modifica gli stili del testo dello schema</a:t>
             </a:r>
           </a:p>
@@ -1786,35 +1792,35 @@
           <a:p>
             <a:pPr lvl="0"/>
             <a:r>
-              <a:rPr lang="it-IT" smtClean="0"/>
+              <a:rPr lang="it-IT"/>
               <a:t>Modifica gli stili del testo dello schema</a:t>
             </a:r>
           </a:p>
           <a:p>
             <a:pPr lvl="1"/>
             <a:r>
-              <a:rPr lang="it-IT" smtClean="0"/>
+              <a:rPr lang="it-IT"/>
               <a:t>Secondo livello</a:t>
             </a:r>
           </a:p>
           <a:p>
             <a:pPr lvl="2"/>
             <a:r>
-              <a:rPr lang="it-IT" smtClean="0"/>
+              <a:rPr lang="it-IT"/>
               <a:t>Terzo livello</a:t>
             </a:r>
           </a:p>
           <a:p>
             <a:pPr lvl="3"/>
             <a:r>
-              <a:rPr lang="it-IT" smtClean="0"/>
+              <a:rPr lang="it-IT"/>
               <a:t>Quarto livello</a:t>
             </a:r>
           </a:p>
           <a:p>
             <a:pPr lvl="4"/>
             <a:r>
-              <a:rPr lang="it-IT" smtClean="0"/>
+              <a:rPr lang="it-IT"/>
               <a:t>Quinto livello</a:t>
             </a:r>
             <a:endParaRPr lang="en-US" dirty="0"/>
@@ -1838,7 +1844,7 @@
           <a:p>
             <a:fld id="{550838AA-B79A-4B3D-A000-978E2F12FD83}" type="datetimeFigureOut">
               <a:rPr lang="en-US" smtClean="0"/>
-              <a:t>2/21/2024</a:t>
+              <a:t>2/21/24</a:t>
             </a:fld>
             <a:endParaRPr lang="en-US"/>
           </a:p>
@@ -1880,7 +1886,7 @@
           <a:p>
             <a:fld id="{ABE17D80-2DC1-4B61-A42F-CD3D496E699C}" type="slidenum">
               <a:rPr lang="en-US" smtClean="0"/>
-              <a:t>‹N›</a:t>
+              <a:t>‹#›</a:t>
             </a:fld>
             <a:endParaRPr lang="en-US"/>
           </a:p>
@@ -1932,7 +1938,7 @@
           <a:lstStyle/>
           <a:p>
             <a:r>
-              <a:rPr lang="it-IT" smtClean="0"/>
+              <a:rPr lang="it-IT"/>
               <a:t>Fare clic per modificare lo stile del titolo</a:t>
             </a:r>
             <a:endParaRPr lang="en-US" dirty="0"/>
@@ -1956,7 +1962,7 @@
           <a:p>
             <a:fld id="{550838AA-B79A-4B3D-A000-978E2F12FD83}" type="datetimeFigureOut">
               <a:rPr lang="en-US" smtClean="0"/>
-              <a:t>2/21/2024</a:t>
+              <a:t>2/21/24</a:t>
             </a:fld>
             <a:endParaRPr lang="en-US"/>
           </a:p>
@@ -1998,7 +2004,7 @@
           <a:p>
             <a:fld id="{ABE17D80-2DC1-4B61-A42F-CD3D496E699C}" type="slidenum">
               <a:rPr lang="en-US" smtClean="0"/>
-              <a:t>‹N›</a:t>
+              <a:t>‹#›</a:t>
             </a:fld>
             <a:endParaRPr lang="en-US"/>
           </a:p>
@@ -2051,7 +2057,7 @@
           <a:p>
             <a:fld id="{550838AA-B79A-4B3D-A000-978E2F12FD83}" type="datetimeFigureOut">
               <a:rPr lang="en-US" smtClean="0"/>
-              <a:t>2/21/2024</a:t>
+              <a:t>2/21/24</a:t>
             </a:fld>
             <a:endParaRPr lang="en-US"/>
           </a:p>
@@ -2093,7 +2099,7 @@
           <a:p>
             <a:fld id="{ABE17D80-2DC1-4B61-A42F-CD3D496E699C}" type="slidenum">
               <a:rPr lang="en-US" smtClean="0"/>
-              <a:t>‹N›</a:t>
+              <a:t>‹#›</a:t>
             </a:fld>
             <a:endParaRPr lang="en-US"/>
           </a:p>
@@ -2198,7 +2204,7 @@
           </a:lstStyle>
           <a:p>
             <a:r>
-              <a:rPr lang="it-IT" smtClean="0"/>
+              <a:rPr lang="it-IT"/>
               <a:t>Fare clic per modificare lo stile del titolo</a:t>
             </a:r>
             <a:endParaRPr lang="en-US" dirty="0"/>
@@ -2255,35 +2261,35 @@
           <a:p>
             <a:pPr lvl="0"/>
             <a:r>
-              <a:rPr lang="it-IT" smtClean="0"/>
+              <a:rPr lang="it-IT"/>
               <a:t>Modifica gli stili del testo dello schema</a:t>
             </a:r>
           </a:p>
           <a:p>
             <a:pPr lvl="1"/>
             <a:r>
-              <a:rPr lang="it-IT" smtClean="0"/>
+              <a:rPr lang="it-IT"/>
               <a:t>Secondo livello</a:t>
             </a:r>
           </a:p>
           <a:p>
             <a:pPr lvl="2"/>
             <a:r>
-              <a:rPr lang="it-IT" smtClean="0"/>
+              <a:rPr lang="it-IT"/>
               <a:t>Terzo livello</a:t>
             </a:r>
           </a:p>
           <a:p>
             <a:pPr lvl="3"/>
             <a:r>
-              <a:rPr lang="it-IT" smtClean="0"/>
+              <a:rPr lang="it-IT"/>
               <a:t>Quarto livello</a:t>
             </a:r>
           </a:p>
           <a:p>
             <a:pPr lvl="4"/>
             <a:r>
-              <a:rPr lang="it-IT" smtClean="0"/>
+              <a:rPr lang="it-IT"/>
               <a:t>Quinto livello</a:t>
             </a:r>
             <a:endParaRPr lang="en-US" dirty="0"/>
@@ -2384,7 +2390,7 @@
               <a:defRPr/>
             </a:pPr>
             <a:r>
-              <a:rPr lang="it-IT" smtClean="0"/>
+              <a:rPr lang="it-IT"/>
               <a:t>Modifica gli stili del testo dello schema</a:t>
             </a:r>
           </a:p>
@@ -2407,7 +2413,7 @@
           <a:p>
             <a:fld id="{550838AA-B79A-4B3D-A000-978E2F12FD83}" type="datetimeFigureOut">
               <a:rPr lang="en-US" smtClean="0"/>
-              <a:t>2/21/2024</a:t>
+              <a:t>2/21/24</a:t>
             </a:fld>
             <a:endParaRPr lang="en-US"/>
           </a:p>
@@ -2459,7 +2465,7 @@
           <a:p>
             <a:fld id="{ABE17D80-2DC1-4B61-A42F-CD3D496E699C}" type="slidenum">
               <a:rPr lang="en-US" smtClean="0"/>
-              <a:t>‹N›</a:t>
+              <a:t>‹#›</a:t>
             </a:fld>
             <a:endParaRPr lang="en-US"/>
           </a:p>
@@ -2534,7 +2540,7 @@
           </a:lstStyle>
           <a:p>
             <a:r>
-              <a:rPr lang="it-IT" smtClean="0"/>
+              <a:rPr lang="it-IT"/>
               <a:t>Fare clic per modificare lo stile del titolo</a:t>
             </a:r>
             <a:endParaRPr lang="en-US" dirty="0"/>
@@ -2615,7 +2621,7 @@
           </a:lstStyle>
           <a:p>
             <a:r>
-              <a:rPr lang="it-IT" smtClean="0"/>
+              <a:rPr lang="it-IT"/>
               <a:t>Fare clic sull'icona per inserire un'immagine</a:t>
             </a:r>
             <a:endParaRPr lang="en-US" dirty="0"/>
@@ -2690,7 +2696,7 @@
           <a:p>
             <a:pPr lvl="0"/>
             <a:r>
-              <a:rPr lang="it-IT" smtClean="0"/>
+              <a:rPr lang="it-IT"/>
               <a:t>Modifica gli stili del testo dello schema</a:t>
             </a:r>
           </a:p>
@@ -2723,7 +2729,7 @@
           <a:p>
             <a:fld id="{550838AA-B79A-4B3D-A000-978E2F12FD83}" type="datetimeFigureOut">
               <a:rPr lang="en-US" smtClean="0"/>
-              <a:t>2/21/2024</a:t>
+              <a:t>2/21/24</a:t>
             </a:fld>
             <a:endParaRPr lang="en-US"/>
           </a:p>
@@ -2785,7 +2791,7 @@
           <a:p>
             <a:fld id="{ABE17D80-2DC1-4B61-A42F-CD3D496E699C}" type="slidenum">
               <a:rPr lang="en-US" smtClean="0"/>
-              <a:t>‹N›</a:t>
+              <a:t>‹#›</a:t>
             </a:fld>
             <a:endParaRPr lang="en-US"/>
           </a:p>
@@ -2852,7 +2858,7 @@
           <a:lstStyle/>
           <a:p>
             <a:r>
-              <a:rPr lang="it-IT" smtClean="0"/>
+              <a:rPr lang="it-IT"/>
               <a:t>Fare clic per modificare lo stile del titolo</a:t>
             </a:r>
             <a:endParaRPr lang="en-US" dirty="0"/>
@@ -2886,35 +2892,35 @@
           <a:p>
             <a:pPr lvl="0"/>
             <a:r>
-              <a:rPr lang="it-IT" smtClean="0"/>
+              <a:rPr lang="it-IT"/>
               <a:t>Modifica gli stili del testo dello schema</a:t>
             </a:r>
           </a:p>
           <a:p>
             <a:pPr lvl="1"/>
             <a:r>
-              <a:rPr lang="it-IT" smtClean="0"/>
+              <a:rPr lang="it-IT"/>
               <a:t>Secondo livello</a:t>
             </a:r>
           </a:p>
           <a:p>
             <a:pPr lvl="2"/>
             <a:r>
-              <a:rPr lang="it-IT" smtClean="0"/>
+              <a:rPr lang="it-IT"/>
               <a:t>Terzo livello</a:t>
             </a:r>
           </a:p>
           <a:p>
             <a:pPr lvl="3"/>
             <a:r>
-              <a:rPr lang="it-IT" smtClean="0"/>
+              <a:rPr lang="it-IT"/>
               <a:t>Quarto livello</a:t>
             </a:r>
           </a:p>
           <a:p>
             <a:pPr lvl="4"/>
             <a:r>
-              <a:rPr lang="it-IT" smtClean="0"/>
+              <a:rPr lang="it-IT"/>
               <a:t>Quinto livello</a:t>
             </a:r>
             <a:endParaRPr lang="en-US" dirty="0"/>
@@ -2956,7 +2962,7 @@
           <a:p>
             <a:fld id="{550838AA-B79A-4B3D-A000-978E2F12FD83}" type="datetimeFigureOut">
               <a:rPr lang="en-US" smtClean="0"/>
-              <a:t>2/21/2024</a:t>
+              <a:t>2/21/24</a:t>
             </a:fld>
             <a:endParaRPr lang="en-US"/>
           </a:p>
@@ -3038,7 +3044,7 @@
           <a:p>
             <a:fld id="{ABE17D80-2DC1-4B61-A42F-CD3D496E699C}" type="slidenum">
               <a:rPr lang="en-US" smtClean="0"/>
-              <a:t>‹N›</a:t>
+              <a:t>‹#›</a:t>
             </a:fld>
             <a:endParaRPr lang="en-US"/>
           </a:p>
@@ -3408,7 +3414,7 @@
           <a:lstStyle/>
           <a:p>
             <a:r>
-              <a:rPr lang="it-IT" smtClean="0">
+              <a:rPr lang="it-IT">
                 <a:solidFill>
                   <a:schemeClr val="tx1"/>
                 </a:solidFill>
@@ -3439,7 +3445,7 @@
           <a:lstStyle/>
           <a:p>
             <a:r>
-              <a:rPr lang="it-IT" b="1" smtClean="0">
+              <a:rPr lang="it-IT" b="1">
                 <a:solidFill>
                   <a:schemeClr val="tx1"/>
                 </a:solidFill>
@@ -3449,7 +3455,7 @@
           </a:p>
           <a:p>
             <a:r>
-              <a:rPr lang="it-IT" smtClean="0">
+              <a:rPr lang="it-IT">
                 <a:solidFill>
                   <a:schemeClr val="tx1"/>
                 </a:solidFill>
@@ -3496,6 +3502,286 @@
       </p:grpSpPr>
       <p:sp>
         <p:nvSpPr>
+          <p:cNvPr id="8" name="Titolo 1">
+            <a:extLst>
+              <a:ext uri="{FF2B5EF4-FFF2-40B4-BE49-F238E27FC236}">
+                <a16:creationId xmlns:a16="http://schemas.microsoft.com/office/drawing/2014/main" id="{E47F3C20-527B-084D-842F-A8690219CE29}"/>
+              </a:ext>
+            </a:extLst>
+          </p:cNvPr>
+          <p:cNvSpPr txBox="1">
+            <a:spLocks/>
+          </p:cNvSpPr>
+          <p:nvPr/>
+        </p:nvSpPr>
+        <p:spPr>
+          <a:xfrm>
+            <a:off x="676656" y="0"/>
+            <a:ext cx="10772775" cy="1114697"/>
+          </a:xfrm>
+          <a:prstGeom prst="rect">
+            <a:avLst/>
+          </a:prstGeom>
+        </p:spPr>
+        <p:txBody>
+          <a:bodyPr vert="horz" lIns="91440" tIns="45720" rIns="91440" bIns="45720" rtlCol="0" anchor="ctr">
+            <a:normAutofit/>
+          </a:bodyPr>
+          <a:lstStyle>
+            <a:lvl1pPr algn="l" defTabSz="914400" rtl="0" eaLnBrk="1" latinLnBrk="0" hangingPunct="1">
+              <a:lnSpc>
+                <a:spcPct val="85000"/>
+              </a:lnSpc>
+              <a:spcBef>
+                <a:spcPct val="0"/>
+              </a:spcBef>
+              <a:buNone/>
+              <a:defRPr sz="5400" kern="1200" spc="-120" baseline="0">
+                <a:solidFill>
+                  <a:schemeClr val="accent1"/>
+                </a:solidFill>
+                <a:latin typeface="+mj-lt"/>
+                <a:ea typeface="+mj-ea"/>
+                <a:cs typeface="+mj-cs"/>
+              </a:defRPr>
+            </a:lvl1pPr>
+          </a:lstStyle>
+          <a:p>
+            <a:r>
+              <a:rPr lang="it-IT" dirty="0"/>
+              <a:t>Software </a:t>
+            </a:r>
+            <a:r>
+              <a:rPr lang="it-IT" dirty="0" err="1"/>
+              <a:t>analysis</a:t>
+            </a:r>
+            <a:endParaRPr lang="en-US" dirty="0"/>
+          </a:p>
+        </p:txBody>
+      </p:sp>
+      <p:sp>
+        <p:nvSpPr>
+          <p:cNvPr id="9" name="TextBox 8">
+            <a:extLst>
+              <a:ext uri="{FF2B5EF4-FFF2-40B4-BE49-F238E27FC236}">
+                <a16:creationId xmlns:a16="http://schemas.microsoft.com/office/drawing/2014/main" id="{95D75415-5DD7-5C47-8B5F-18811BE80B35}"/>
+              </a:ext>
+            </a:extLst>
+          </p:cNvPr>
+          <p:cNvSpPr txBox="1"/>
+          <p:nvPr/>
+        </p:nvSpPr>
+        <p:spPr>
+          <a:xfrm>
+            <a:off x="742569" y="1114697"/>
+            <a:ext cx="4637680" cy="461665"/>
+          </a:xfrm>
+          <a:prstGeom prst="rect">
+            <a:avLst/>
+          </a:prstGeom>
+          <a:noFill/>
+        </p:spPr>
+        <p:txBody>
+          <a:bodyPr wrap="none" rtlCol="0">
+            <a:spAutoFit/>
+          </a:bodyPr>
+          <a:lstStyle/>
+          <a:p>
+            <a:r>
+              <a:rPr lang="it-IT" sz="2400" dirty="0"/>
+              <a:t>The </a:t>
+            </a:r>
+            <a:r>
+              <a:rPr lang="it-IT" sz="2400" dirty="0" err="1"/>
+              <a:t>framework</a:t>
+            </a:r>
+            <a:r>
+              <a:rPr lang="it-IT" sz="2400" dirty="0"/>
+              <a:t> </a:t>
+            </a:r>
+            <a:r>
+              <a:rPr lang="it-IT" sz="2400" dirty="0" err="1"/>
+              <a:t>used</a:t>
+            </a:r>
+            <a:r>
+              <a:rPr lang="it-IT" sz="2400" dirty="0"/>
+              <a:t> </a:t>
+            </a:r>
+            <a:r>
+              <a:rPr lang="it-IT" sz="2400" dirty="0" err="1"/>
+              <a:t>is</a:t>
+            </a:r>
+            <a:r>
+              <a:rPr lang="it-IT" sz="2400" dirty="0"/>
+              <a:t> ROOT CERN</a:t>
+            </a:r>
+          </a:p>
+        </p:txBody>
+      </p:sp>
+      <p:pic>
+        <p:nvPicPr>
+          <p:cNvPr id="13" name="Picture 12" descr="A black background with white text&#10;&#10;Description automatically generated">
+            <a:extLst>
+              <a:ext uri="{FF2B5EF4-FFF2-40B4-BE49-F238E27FC236}">
+                <a16:creationId xmlns:a16="http://schemas.microsoft.com/office/drawing/2014/main" id="{F4AB04A7-DBDB-AA42-9F35-EE7C289B593B}"/>
+              </a:ext>
+            </a:extLst>
+          </p:cNvPr>
+          <p:cNvPicPr>
+            <a:picLocks noChangeAspect="1"/>
+          </p:cNvPicPr>
+          <p:nvPr/>
+        </p:nvPicPr>
+        <p:blipFill>
+          <a:blip r:embed="rId2">
+            <a:extLst>
+              <a:ext uri="{28A0092B-C50C-407E-A947-70E740481C1C}">
+                <a14:useLocalDpi xmlns:a14="http://schemas.microsoft.com/office/drawing/2010/main" val="0"/>
+              </a:ext>
+            </a:extLst>
+          </a:blip>
+          <a:stretch>
+            <a:fillRect/>
+          </a:stretch>
+        </p:blipFill>
+        <p:spPr>
+          <a:xfrm>
+            <a:off x="9745883" y="255411"/>
+            <a:ext cx="2122990" cy="603873"/>
+          </a:xfrm>
+          <a:prstGeom prst="rect">
+            <a:avLst/>
+          </a:prstGeom>
+        </p:spPr>
+      </p:pic>
+      <p:sp>
+        <p:nvSpPr>
+          <p:cNvPr id="14" name="TextBox 13">
+            <a:extLst>
+              <a:ext uri="{FF2B5EF4-FFF2-40B4-BE49-F238E27FC236}">
+                <a16:creationId xmlns:a16="http://schemas.microsoft.com/office/drawing/2014/main" id="{44DCA795-4725-6741-BEC0-F9360465E377}"/>
+              </a:ext>
+            </a:extLst>
+          </p:cNvPr>
+          <p:cNvSpPr txBox="1"/>
+          <p:nvPr/>
+        </p:nvSpPr>
+        <p:spPr>
+          <a:xfrm>
+            <a:off x="742569" y="1576362"/>
+            <a:ext cx="5241115" cy="1200329"/>
+          </a:xfrm>
+          <a:prstGeom prst="rect">
+            <a:avLst/>
+          </a:prstGeom>
+          <a:noFill/>
+        </p:spPr>
+        <p:txBody>
+          <a:bodyPr wrap="none" rtlCol="0">
+            <a:spAutoFit/>
+          </a:bodyPr>
+          <a:lstStyle/>
+          <a:p>
+            <a:r>
+              <a:rPr lang="it-IT" sz="2400" dirty="0"/>
+              <a:t>The code </a:t>
+            </a:r>
+            <a:r>
+              <a:rPr lang="it-IT" sz="2400" dirty="0" err="1"/>
+              <a:t>developed</a:t>
+            </a:r>
+            <a:r>
+              <a:rPr lang="it-IT" sz="2400" dirty="0"/>
+              <a:t> </a:t>
+            </a:r>
+            <a:r>
+              <a:rPr lang="it-IT" sz="2400" dirty="0" err="1"/>
+              <a:t>is</a:t>
+            </a:r>
+            <a:r>
+              <a:rPr lang="it-IT" sz="2400" dirty="0"/>
+              <a:t> in C++ and </a:t>
+            </a:r>
+            <a:r>
+              <a:rPr lang="it-IT" sz="2400" dirty="0" err="1"/>
+              <a:t>aim</a:t>
+            </a:r>
+            <a:r>
+              <a:rPr lang="it-IT" sz="2400" dirty="0"/>
+              <a:t> to:</a:t>
+            </a:r>
+          </a:p>
+          <a:p>
+            <a:pPr marL="342900" indent="-342900">
+              <a:buFont typeface="Arial" panose="020B0604020202020204" pitchFamily="34" charset="0"/>
+              <a:buChar char="•"/>
+            </a:pPr>
+            <a:r>
+              <a:rPr lang="it-IT" sz="2400" dirty="0"/>
+              <a:t>create </a:t>
+            </a:r>
+            <a:r>
+              <a:rPr lang="it-IT" sz="2400" dirty="0" err="1"/>
+              <a:t>readable</a:t>
+            </a:r>
+            <a:r>
+              <a:rPr lang="it-IT" sz="2400" dirty="0"/>
+              <a:t> plots</a:t>
+            </a:r>
+          </a:p>
+          <a:p>
+            <a:pPr marL="342900" indent="-342900">
+              <a:buFont typeface="Arial" panose="020B0604020202020204" pitchFamily="34" charset="0"/>
+              <a:buChar char="•"/>
+            </a:pPr>
+            <a:r>
+              <a:rPr lang="it-IT" sz="2400" dirty="0" err="1"/>
+              <a:t>fitting</a:t>
+            </a:r>
+            <a:r>
+              <a:rPr lang="it-IT" sz="2400" dirty="0"/>
+              <a:t> the </a:t>
+            </a:r>
+            <a:r>
+              <a:rPr lang="it-IT" sz="2400" dirty="0" err="1"/>
+              <a:t>graphs</a:t>
+            </a:r>
+            <a:endParaRPr lang="it-IT" sz="2400" dirty="0"/>
+          </a:p>
+        </p:txBody>
+      </p:sp>
+    </p:spTree>
+    <p:extLst>
+      <p:ext uri="{BB962C8B-B14F-4D97-AF65-F5344CB8AC3E}">
+        <p14:creationId xmlns:p14="http://schemas.microsoft.com/office/powerpoint/2010/main" val="625028779"/>
+      </p:ext>
+    </p:extLst>
+  </p:cSld>
+  <p:clrMapOvr>
+    <a:masterClrMapping/>
+  </p:clrMapOvr>
+</p:sld>
+</file>
+
+<file path=ppt/slides/slide11.xml><?xml version="1.0" encoding="utf-8"?>
+<p:sld xmlns:a="http://schemas.openxmlformats.org/drawingml/2006/main" xmlns:r="http://schemas.openxmlformats.org/officeDocument/2006/relationships" xmlns:p="http://schemas.openxmlformats.org/presentationml/2006/main">
+  <p:cSld>
+    <p:spTree>
+      <p:nvGrpSpPr>
+        <p:cNvPr id="1" name=""/>
+        <p:cNvGrpSpPr/>
+        <p:nvPr/>
+      </p:nvGrpSpPr>
+      <p:grpSpPr>
+        <a:xfrm>
+          <a:off x="0" y="0"/>
+          <a:ext cx="0" cy="0"/>
+          <a:chOff x="0" y="0"/>
+          <a:chExt cx="0" cy="0"/>
+        </a:xfrm>
+      </p:grpSpPr>
+      <p:sp>
+        <p:nvSpPr>
           <p:cNvPr id="2" name="Titolo 1"/>
           <p:cNvSpPr>
             <a:spLocks noGrp="1"/>
@@ -3515,7 +3801,7 @@
           <a:lstStyle/>
           <a:p>
             <a:r>
-              <a:rPr lang="it-IT" smtClean="0"/>
+              <a:rPr lang="it-IT"/>
               <a:t>Data collection and analysis</a:t>
             </a:r>
             <a:endParaRPr lang="en-US"/>
@@ -3548,7 +3834,7 @@
               <a:buNone/>
             </a:pPr>
             <a:r>
-              <a:rPr lang="it-IT" smtClean="0"/>
+              <a:rPr lang="it-IT"/>
               <a:t>Some data concerning some particular situations have  been collected</a:t>
             </a:r>
           </a:p>
@@ -3600,7 +3886,7 @@
           <a:lstStyle/>
           <a:p>
             <a:r>
-              <a:rPr lang="it-IT" smtClean="0"/>
+              <a:rPr lang="it-IT"/>
               <a:t>Presentation outline</a:t>
             </a:r>
             <a:endParaRPr lang="en-US"/>
@@ -3627,7 +3913,7 @@
               <a:buChar char="§"/>
             </a:pPr>
             <a:r>
-              <a:rPr lang="it-IT" smtClean="0"/>
+              <a:rPr lang="it-IT"/>
               <a:t> Brief description of the pancreas;</a:t>
             </a:r>
           </a:p>
@@ -3638,11 +3924,7 @@
             </a:pPr>
             <a:r>
               <a:rPr lang="it-IT"/>
-              <a:t> </a:t>
-            </a:r>
-            <a:r>
-              <a:rPr lang="it-IT" smtClean="0"/>
-              <a:t>the importance of an artificial pancreas for people with diabetes;</a:t>
+              <a:t> the importance of an artificial pancreas for people with diabetes;</a:t>
             </a:r>
           </a:p>
           <a:p>
@@ -3651,7 +3933,7 @@
               <a:buChar char="§"/>
             </a:pPr>
             <a:r>
-              <a:rPr lang="it-IT" smtClean="0"/>
+              <a:rPr lang="it-IT"/>
               <a:t> electrical circuit implemented with Arduino;</a:t>
             </a:r>
           </a:p>
@@ -3662,11 +3944,7 @@
             </a:pPr>
             <a:r>
               <a:rPr lang="it-IT"/>
-              <a:t> </a:t>
-            </a:r>
-            <a:r>
-              <a:rPr lang="it-IT" smtClean="0"/>
-              <a:t>preliminary measurement and offset problem;</a:t>
+              <a:t> preliminary measurement and offset problem;</a:t>
             </a:r>
           </a:p>
           <a:p>
@@ -3676,11 +3954,7 @@
             </a:pPr>
             <a:r>
               <a:rPr lang="it-IT"/>
-              <a:t> </a:t>
-            </a:r>
-            <a:r>
-              <a:rPr lang="it-IT" smtClean="0"/>
-              <a:t>data collection and analysis;</a:t>
+              <a:t> data collection and analysis;</a:t>
             </a:r>
           </a:p>
           <a:p>
@@ -3690,11 +3964,7 @@
             </a:pPr>
             <a:r>
               <a:rPr lang="it-IT"/>
-              <a:t> </a:t>
-            </a:r>
-            <a:r>
-              <a:rPr lang="it-IT" smtClean="0"/>
-              <a:t>conclusions of the project</a:t>
+              <a:t> conclusions of the project</a:t>
             </a:r>
           </a:p>
         </p:txBody>
@@ -3750,7 +4020,7 @@
           <a:lstStyle/>
           <a:p>
             <a:r>
-              <a:rPr lang="it-IT" smtClean="0"/>
+              <a:rPr lang="it-IT"/>
               <a:t>The pancreas</a:t>
             </a:r>
             <a:endParaRPr lang="en-US"/>
@@ -3783,7 +4053,7 @@
               <a:buNone/>
             </a:pPr>
             <a:r>
-              <a:rPr lang="it-IT" smtClean="0"/>
+              <a:rPr lang="it-IT"/>
               <a:t>It is an organ which, among the other functions, regulates the concentration of glucose in blood through two hormones:</a:t>
             </a:r>
           </a:p>
@@ -3793,40 +4063,12 @@
               <a:buChar char="§"/>
             </a:pPr>
             <a:r>
-              <a:rPr lang="it-IT" smtClean="0"/>
+              <a:rPr lang="it-IT"/>
               <a:t> insulin: </a:t>
             </a:r>
             <a:r>
               <a:rPr lang="en-US"/>
-              <a:t>peptide </a:t>
-            </a:r>
-            <a:r>
-              <a:rPr lang="en-US"/>
-              <a:t>hormone </a:t>
-            </a:r>
-            <a:r>
-              <a:rPr lang="en-US" smtClean="0"/>
-              <a:t>considered </a:t>
-            </a:r>
-            <a:r>
-              <a:rPr lang="en-US"/>
-              <a:t>to be the </a:t>
-            </a:r>
-            <a:r>
-              <a:rPr lang="en-US"/>
-              <a:t>main </a:t>
-            </a:r>
-            <a:r>
-              <a:rPr lang="en-US" smtClean="0"/>
-              <a:t>anabolic hormone </a:t>
-            </a:r>
-            <a:r>
-              <a:rPr lang="en-US"/>
-              <a:t>of the body. It regulates the metabolism of carbohydrates, fats and protein</a:t>
-            </a:r>
-            <a:r>
-              <a:rPr lang="en-US"/>
-              <a:t/>
+              <a:t>peptide hormone considered to be the main anabolic hormone of the body. It regulates the metabolism of carbohydrates, fats and protein</a:t>
             </a:r>
             <a:br>
               <a:rPr lang="en-US"/>
@@ -3835,10 +4077,6 @@
               <a:rPr lang="en-US"/>
               <a:t>by promoting the absorption of glucose from the blood into liver, fat and skeletal</a:t>
             </a:r>
-            <a:r>
-              <a:rPr lang="en-US"/>
-              <a:t/>
-            </a:r>
             <a:br>
               <a:rPr lang="en-US"/>
             </a:br>
@@ -3846,7 +4084,7 @@
               <a:rPr lang="en-US"/>
               <a:t>muscle cells.</a:t>
             </a:r>
-            <a:endParaRPr lang="it-IT" smtClean="0"/>
+            <a:endParaRPr lang="it-IT"/>
           </a:p>
           <a:p>
             <a:pPr>
@@ -3854,41 +4092,20 @@
               <a:buChar char="§"/>
             </a:pPr>
             <a:r>
-              <a:rPr lang="it-IT" smtClean="0"/>
+              <a:rPr lang="it-IT"/>
               <a:t> glucagon:</a:t>
             </a:r>
             <a:r>
-              <a:rPr lang="en-US" smtClean="0"/>
-              <a:t> </a:t>
-            </a:r>
-            <a:r>
               <a:rPr lang="en-US"/>
-              <a:t>peptide hormone, produced by alpha cells of the pancreas. It raises</a:t>
-            </a:r>
-            <a:r>
-              <a:rPr lang="en-US"/>
-              <a:t/>
+              <a:t> peptide hormone, produced by alpha cells of the pancreas. It raises</a:t>
             </a:r>
             <a:br>
               <a:rPr lang="en-US"/>
             </a:br>
             <a:r>
               <a:rPr lang="en-US"/>
-              <a:t>the concentration of glucose and fatty acids in </a:t>
-            </a:r>
-            <a:r>
-              <a:rPr lang="en-US"/>
-              <a:t>the </a:t>
-            </a:r>
-            <a:r>
-              <a:rPr lang="en-US" smtClean="0"/>
-              <a:t>bloodstream. </a:t>
-            </a:r>
-            <a:r>
-              <a:rPr lang="en-US"/>
-              <a:t>Its effect is opposite to that of insulin.</a:t>
-            </a:r>
-            <a:endParaRPr lang="en-US"/>
+              <a:t>the concentration of glucose and fatty acids in the bloodstream. Its effect is opposite to that of insulin.</a:t>
+            </a:r>
           </a:p>
         </p:txBody>
       </p:sp>
@@ -3973,7 +4190,7 @@
           <a:lstStyle/>
           <a:p>
             <a:r>
-              <a:rPr lang="it-IT" smtClean="0"/>
+              <a:rPr lang="it-IT"/>
               <a:t>Diabetes</a:t>
             </a:r>
             <a:endParaRPr lang="en-US"/>
@@ -4006,7 +4223,7 @@
               <a:buNone/>
             </a:pPr>
             <a:r>
-              <a:rPr lang="it-IT" smtClean="0"/>
+              <a:rPr lang="it-IT"/>
               <a:t>Diabetes is a condition for which the human body is unable to self regulate the concentration of glucose in blood. If untreated it can lead to severe symptoms and problems related to hyperglycemia or hypoglycemia. Diabetes exists in two forms:</a:t>
             </a:r>
           </a:p>
@@ -4020,90 +4237,26 @@
               <a:t> </a:t>
             </a:r>
             <a:r>
-              <a:rPr lang="it-IT" b="1" smtClean="0"/>
+              <a:rPr lang="it-IT" b="1"/>
               <a:t>type 1</a:t>
             </a:r>
             <a:r>
-              <a:rPr lang="it-IT" smtClean="0"/>
+              <a:rPr lang="it-IT"/>
               <a:t>: </a:t>
             </a:r>
             <a:r>
-              <a:rPr lang="en-US" smtClean="0"/>
-              <a:t>chronic </a:t>
-            </a:r>
-            <a:r>
               <a:rPr lang="en-US"/>
-              <a:t>autoimmune </a:t>
+              <a:t>chronic autoimmune disease in which the immune system attacks the insulin-secreting beta cells of the pancreas. Insulin is needed to keep blood sugar levels within optimal ranges, and its lack can lead to high blood sugar. Type 1 diabetes can develop at any age but is most often diagnosed before age 40. For people living with type 1 diabetes, </a:t>
+            </a:r>
+            <a:r>
+              <a:rPr lang="en-US" b="1"/>
+              <a:t>insulin injections</a:t>
             </a:r>
             <a:r>
               <a:rPr lang="en-US"/>
-              <a:t>disease </a:t>
-            </a:r>
-            <a:r>
-              <a:rPr lang="en-US" smtClean="0"/>
-              <a:t>in which </a:t>
-            </a:r>
-            <a:r>
-              <a:rPr lang="en-US"/>
-              <a:t>the immune system attacks the insulin-secreting beta cells of </a:t>
-            </a:r>
-            <a:r>
-              <a:rPr lang="en-US"/>
-              <a:t>the </a:t>
-            </a:r>
-            <a:r>
-              <a:rPr lang="en-US" smtClean="0"/>
-              <a:t>pancreas. Insulin </a:t>
-            </a:r>
-            <a:r>
-              <a:rPr lang="en-US"/>
-              <a:t>is needed to keep blood sugar levels within optimal ranges, and its </a:t>
-            </a:r>
-            <a:r>
-              <a:rPr lang="en-US"/>
-              <a:t>lack </a:t>
-            </a:r>
-            <a:r>
-              <a:rPr lang="en-US" smtClean="0"/>
-              <a:t>can lead </a:t>
-            </a:r>
-            <a:r>
-              <a:rPr lang="en-US"/>
-              <a:t>to high blood sugar. Type 1 diabetes can develop at any age but is </a:t>
-            </a:r>
-            <a:r>
-              <a:rPr lang="en-US"/>
-              <a:t>most </a:t>
-            </a:r>
-            <a:r>
-              <a:rPr lang="en-US" smtClean="0"/>
-              <a:t>often diagnosed </a:t>
-            </a:r>
-            <a:r>
-              <a:rPr lang="en-US"/>
-              <a:t>before age 40. For people living with type 1 diabetes, </a:t>
-            </a:r>
-            <a:r>
-              <a:rPr lang="en-US" b="1"/>
-              <a:t>insulin </a:t>
-            </a:r>
-            <a:r>
-              <a:rPr lang="en-US" b="1"/>
-              <a:t>injections</a:t>
-            </a:r>
-            <a:r>
-              <a:rPr lang="en-US"/>
-              <a:t> </a:t>
-            </a:r>
-            <a:r>
-              <a:rPr lang="en-US" smtClean="0"/>
-              <a:t>are critical </a:t>
-            </a:r>
-            <a:r>
-              <a:rPr lang="en-US"/>
-              <a:t>for survival</a:t>
-            </a:r>
-            <a:endParaRPr lang="it-IT" smtClean="0"/>
+              <a:t> are critical for survival</a:t>
+            </a:r>
+            <a:endParaRPr lang="it-IT"/>
           </a:p>
           <a:p>
             <a:pPr>
@@ -4115,106 +4268,17 @@
               <a:t> </a:t>
             </a:r>
             <a:r>
-              <a:rPr lang="it-IT" b="1" smtClean="0"/>
+              <a:rPr lang="it-IT" b="1"/>
               <a:t>type 2</a:t>
             </a:r>
             <a:r>
-              <a:rPr lang="it-IT" smtClean="0"/>
+              <a:rPr lang="it-IT"/>
               <a:t>: </a:t>
             </a:r>
             <a:r>
-              <a:rPr lang="en-US" smtClean="0"/>
-              <a:t>most </a:t>
-            </a:r>
-            <a:r>
               <a:rPr lang="en-US"/>
-              <a:t>common form </a:t>
-            </a:r>
-            <a:r>
-              <a:rPr lang="en-US"/>
-              <a:t>of </a:t>
-            </a:r>
-            <a:r>
-              <a:rPr lang="en-US" smtClean="0"/>
-              <a:t>diabetes. The </a:t>
-            </a:r>
-            <a:r>
-              <a:rPr lang="en-US"/>
-              <a:t>causes for high blood sugar in this form of </a:t>
-            </a:r>
-            <a:r>
-              <a:rPr lang="en-US"/>
-              <a:t>diabetes </a:t>
-            </a:r>
-            <a:r>
-              <a:rPr lang="en-US" smtClean="0"/>
-              <a:t>are usually </a:t>
-            </a:r>
-            <a:r>
-              <a:rPr lang="en-US"/>
-              <a:t>a </a:t>
-            </a:r>
-            <a:r>
-              <a:rPr lang="en-US"/>
-              <a:t>combination </a:t>
-            </a:r>
-            <a:r>
-              <a:rPr lang="en-US" smtClean="0"/>
-              <a:t>of insulin </a:t>
-            </a:r>
-            <a:r>
-              <a:rPr lang="en-US"/>
-              <a:t>resistance and impaired </a:t>
-            </a:r>
-            <a:r>
-              <a:rPr lang="en-US"/>
-              <a:t>insulin </a:t>
-            </a:r>
-            <a:r>
-              <a:rPr lang="en-US" smtClean="0"/>
-              <a:t>secretion. </a:t>
-            </a:r>
-            <a:r>
-              <a:rPr lang="en-US"/>
-              <a:t>Over time</a:t>
-            </a:r>
-            <a:r>
-              <a:rPr lang="en-US"/>
-              <a:t>, </a:t>
-            </a:r>
-            <a:r>
-              <a:rPr lang="en-US" smtClean="0"/>
-              <a:t>pancreatic beta </a:t>
-            </a:r>
-            <a:r>
-              <a:rPr lang="en-US"/>
-              <a:t>cells may become ”exhausted” and less functional. The management </a:t>
-            </a:r>
-            <a:r>
-              <a:rPr lang="en-US"/>
-              <a:t>of </a:t>
-            </a:r>
-            <a:r>
-              <a:rPr lang="en-US" smtClean="0"/>
-              <a:t>type 2 </a:t>
-            </a:r>
-            <a:r>
-              <a:rPr lang="en-US"/>
-              <a:t>diabetes involves a combination of lifestyle measures, medications if </a:t>
-            </a:r>
-            <a:r>
-              <a:rPr lang="en-US"/>
-              <a:t>required </a:t>
-            </a:r>
-            <a:r>
-              <a:rPr lang="en-US" smtClean="0"/>
-              <a:t>and potentially </a:t>
-            </a:r>
-            <a:r>
-              <a:rPr lang="en-US"/>
-              <a:t>insulin.</a:t>
-            </a:r>
-            <a:endParaRPr lang="en-US"/>
+              <a:t>most common form of diabetes. The causes for high blood sugar in this form of diabetes are usually a combination of insulin resistance and impaired insulin secretion. Over time, pancreatic beta cells may become ”exhausted” and less functional. The management of type 2 diabetes involves a combination of lifestyle measures, medications if required and potentially insulin.</a:t>
+            </a:r>
           </a:p>
         </p:txBody>
       </p:sp>
@@ -4269,7 +4333,7 @@
           <a:lstStyle/>
           <a:p>
             <a:r>
-              <a:rPr lang="it-IT" smtClean="0"/>
+              <a:rPr lang="it-IT"/>
               <a:t>The importance of an artificial pancreas</a:t>
             </a:r>
             <a:endParaRPr lang="en-US"/>
@@ -4302,7 +4366,7 @@
               <a:buNone/>
             </a:pPr>
             <a:r>
-              <a:rPr lang="it-IT" smtClean="0"/>
+              <a:rPr lang="it-IT"/>
               <a:t>People with diabetes need to continuously monitor the concentration of glucose in blood and assume insulin after meals.</a:t>
             </a:r>
           </a:p>
@@ -4311,15 +4375,15 @@
               <a:buNone/>
             </a:pPr>
             <a:r>
-              <a:rPr lang="it-IT" smtClean="0"/>
+              <a:rPr lang="it-IT"/>
               <a:t>Knowing how much insulin to assume is critical to maintain the glucose concentration in a safe range. This is why electronic systems called </a:t>
             </a:r>
             <a:r>
-              <a:rPr lang="it-IT" b="1" smtClean="0"/>
+              <a:rPr lang="it-IT" b="1"/>
               <a:t>artificial pancreases exist.</a:t>
             </a:r>
             <a:r>
-              <a:rPr lang="it-IT" smtClean="0"/>
+              <a:rPr lang="it-IT"/>
               <a:t> They come in different variants but usually have these 3 components: </a:t>
             </a:r>
           </a:p>
@@ -4333,7 +4397,7 @@
               <a:t> </a:t>
             </a:r>
             <a:r>
-              <a:rPr lang="it-IT" smtClean="0"/>
+              <a:rPr lang="it-IT"/>
               <a:t>continuous glucose monitor (cgm) that measures the glucose concentration every few minutes;</a:t>
             </a:r>
           </a:p>
@@ -4347,7 +4411,7 @@
               <a:t> </a:t>
             </a:r>
             <a:r>
-              <a:rPr lang="it-IT" smtClean="0"/>
+              <a:rPr lang="it-IT"/>
               <a:t>program which calculates how much insulin is needed;</a:t>
             </a:r>
           </a:p>
@@ -4361,7 +4425,7 @@
               <a:t> </a:t>
             </a:r>
             <a:r>
-              <a:rPr lang="it-IT" smtClean="0"/>
+              <a:rPr lang="it-IT"/>
               <a:t>insulin infusion pump.</a:t>
             </a:r>
             <a:endParaRPr lang="en-US" b="1"/>
@@ -4419,15 +4483,15 @@
           <a:lstStyle/>
           <a:p>
             <a:r>
-              <a:rPr lang="it-IT" smtClean="0"/>
+              <a:rPr lang="it-IT"/>
               <a:t>The devised circuit</a:t>
             </a:r>
             <a:endParaRPr lang="en-US"/>
           </a:p>
         </p:txBody>
       </p:sp>
-      <mc:AlternateContent xmlns:mc="http://schemas.openxmlformats.org/markup-compatibility/2006">
-        <mc:Choice xmlns:a14="http://schemas.microsoft.com/office/drawing/2010/main" Requires="a14">
+      <mc:AlternateContent xmlns:mc="http://schemas.openxmlformats.org/markup-compatibility/2006" xmlns:a14="http://schemas.microsoft.com/office/drawing/2010/main">
+        <mc:Choice Requires="a14">
           <p:sp>
             <p:nvSpPr>
               <p:cNvPr id="3" name="Segnaposto contenuto 2"/>
@@ -4454,7 +4518,7 @@
                   <a:buNone/>
                 </a:pPr>
                 <a:r>
-                  <a:rPr lang="it-IT" smtClean="0"/>
+                  <a:rPr lang="it-IT"/>
                   <a:t>To simulate the feedback system of the pancreas an analogy has been used:</a:t>
                 </a:r>
               </a:p>
@@ -4465,11 +4529,7 @@
                 </a:pPr>
                 <a:r>
                   <a:rPr lang="it-IT"/>
-                  <a:t> </a:t>
-                </a:r>
-                <a:r>
-                  <a:rPr lang="it-IT" smtClean="0"/>
-                  <a:t>water container with a variable quantity of salt and conductivity;</a:t>
+                  <a:t> water container with a variable quantity of salt and conductivity;</a:t>
                 </a:r>
               </a:p>
               <a:p>
@@ -4479,11 +4539,7 @@
                 </a:pPr>
                 <a:r>
                   <a:rPr lang="it-IT"/>
-                  <a:t> </a:t>
-                </a:r>
-                <a:r>
-                  <a:rPr lang="it-IT" smtClean="0"/>
-                  <a:t>conductivity sensor made of two aluminum foils immersed in water;</a:t>
+                  <a:t> conductivity sensor made of two aluminum foils immersed in water;</a:t>
                 </a:r>
               </a:p>
               <a:p>
@@ -4493,11 +4549,7 @@
                 </a:pPr>
                 <a:r>
                   <a:rPr lang="it-IT"/>
-                  <a:t> </a:t>
-                </a:r>
-                <a:r>
-                  <a:rPr lang="it-IT" smtClean="0"/>
-                  <a:t>two reservoirs of salt water (insulin) and tap water (glucagon);</a:t>
+                  <a:t> two reservoirs of salt water (insulin) and tap water (glucagon);</a:t>
                 </a:r>
               </a:p>
               <a:p>
@@ -4507,11 +4559,7 @@
                 </a:pPr>
                 <a:r>
                   <a:rPr lang="it-IT"/>
-                  <a:t> </a:t>
-                </a:r>
-                <a:r>
-                  <a:rPr lang="it-IT" smtClean="0"/>
-                  <a:t>Arduino UNO board that monitors, every 0.5 s, the conductivity of water and activates two water pumps to control the salt concentration and reset it in a safe range </a:t>
+                  <a:t> Arduino UNO board that monitors, every 0.5 s, the conductivity of water and activates two water pumps to control the salt concentration and reset it in a safe range </a:t>
                 </a:r>
                 <a14:m>
                   <m:oMath xmlns:m="http://schemas.openxmlformats.org/officeDocument/2006/math">
@@ -4586,15 +4634,14 @@
                   </m:oMath>
                 </a14:m>
                 <a:r>
-                  <a:rPr lang="en-US" smtClean="0"/>
+                  <a:rPr lang="en-US"/>
                   <a:t>.</a:t>
                 </a:r>
-                <a:endParaRPr lang="en-US"/>
               </a:p>
             </p:txBody>
           </p:sp>
         </mc:Choice>
-        <mc:Fallback>
+        <mc:Fallback xmlns="">
           <p:sp>
             <p:nvSpPr>
               <p:cNvPr id="3" name="Segnaposto contenuto 2"/>
@@ -4713,7 +4760,7 @@
           <a:lstStyle/>
           <a:p>
             <a:r>
-              <a:rPr lang="it-IT" smtClean="0"/>
+              <a:rPr lang="it-IT"/>
               <a:t>The material used</a:t>
             </a:r>
             <a:endParaRPr lang="en-US"/>
@@ -4747,7 +4794,7 @@
               <a:buChar char="§"/>
             </a:pPr>
             <a:r>
-              <a:rPr lang="it-IT" smtClean="0"/>
+              <a:rPr lang="it-IT"/>
               <a:t> Conductivity sensor;</a:t>
             </a:r>
           </a:p>
@@ -4758,11 +4805,7 @@
             </a:pPr>
             <a:r>
               <a:rPr lang="it-IT"/>
-              <a:t> </a:t>
-            </a:r>
-            <a:r>
-              <a:rPr lang="it-IT" smtClean="0"/>
-              <a:t>two water pumps with ratings 3 V, 650 mA, 3-6 W;</a:t>
+              <a:t> two water pumps with ratings 3 V, 650 mA, 3-6 W;</a:t>
             </a:r>
           </a:p>
           <a:p>
@@ -4772,11 +4815,7 @@
             </a:pPr>
             <a:r>
               <a:rPr lang="it-IT"/>
-              <a:t> </a:t>
-            </a:r>
-            <a:r>
-              <a:rPr lang="it-IT" smtClean="0"/>
-              <a:t>external 4.5 V battery;</a:t>
+              <a:t> external 4.5 V battery;</a:t>
             </a:r>
           </a:p>
           <a:p>
@@ -4786,11 +4825,7 @@
             </a:pPr>
             <a:r>
               <a:rPr lang="it-IT"/>
-              <a:t> </a:t>
-            </a:r>
-            <a:r>
-              <a:rPr lang="it-IT" smtClean="0"/>
-              <a:t>two 2n2222a NPN transistors;</a:t>
+              <a:t> two 2n2222a NPN transistors;</a:t>
             </a:r>
           </a:p>
           <a:p>
@@ -4800,11 +4835,7 @@
             </a:pPr>
             <a:r>
               <a:rPr lang="it-IT"/>
-              <a:t> </a:t>
-            </a:r>
-            <a:r>
-              <a:rPr lang="it-IT" smtClean="0"/>
-              <a:t>two 1 kOhm potentiometers;</a:t>
+              <a:t> two 1 kOhm potentiometers;</a:t>
             </a:r>
           </a:p>
           <a:p>
@@ -4814,11 +4845,7 @@
             </a:pPr>
             <a:r>
               <a:rPr lang="it-IT"/>
-              <a:t> </a:t>
-            </a:r>
-            <a:r>
-              <a:rPr lang="it-IT" smtClean="0"/>
-              <a:t>Arduino UNO board.</a:t>
+              <a:t> Arduino UNO board.</a:t>
             </a:r>
             <a:endParaRPr lang="en-US"/>
           </a:p>
@@ -4905,15 +4932,15 @@
           <a:lstStyle/>
           <a:p>
             <a:r>
-              <a:rPr lang="it-IT" smtClean="0"/>
+              <a:rPr lang="it-IT"/>
               <a:t>LabVIEW interface</a:t>
             </a:r>
             <a:endParaRPr lang="en-US"/>
           </a:p>
         </p:txBody>
       </p:sp>
-      <mc:AlternateContent xmlns:mc="http://schemas.openxmlformats.org/markup-compatibility/2006">
-        <mc:Choice xmlns:a14="http://schemas.microsoft.com/office/drawing/2010/main" Requires="a14">
+      <mc:AlternateContent xmlns:mc="http://schemas.openxmlformats.org/markup-compatibility/2006" xmlns:a14="http://schemas.microsoft.com/office/drawing/2010/main">
+        <mc:Choice Requires="a14">
           <p:sp>
             <p:nvSpPr>
               <p:cNvPr id="3" name="Segnaposto contenuto 2"/>
@@ -4940,8 +4967,64 @@
                   <a:buNone/>
                 </a:pPr>
                 <a:r>
-                  <a:rPr lang="it-IT" smtClean="0"/>
-                  <a:t>A LabVIEW interface has been created with the following functions:</a:t>
+                  <a:rPr lang="it-IT" dirty="0"/>
+                  <a:t>A </a:t>
+                </a:r>
+                <a:r>
+                  <a:rPr lang="it-IT" dirty="0" err="1"/>
+                  <a:t>LabVIEW</a:t>
+                </a:r>
+                <a:r>
+                  <a:rPr lang="it-IT" dirty="0"/>
+                  <a:t> </a:t>
+                </a:r>
+                <a:r>
+                  <a:rPr lang="it-IT" dirty="0" err="1"/>
+                  <a:t>interface</a:t>
+                </a:r>
+                <a:r>
+                  <a:rPr lang="it-IT" dirty="0"/>
+                  <a:t> </a:t>
+                </a:r>
+                <a:r>
+                  <a:rPr lang="it-IT" dirty="0" err="1"/>
+                  <a:t>has</a:t>
+                </a:r>
+                <a:r>
+                  <a:rPr lang="it-IT" dirty="0"/>
+                  <a:t> </a:t>
+                </a:r>
+                <a:r>
+                  <a:rPr lang="it-IT" dirty="0" err="1"/>
+                  <a:t>been</a:t>
+                </a:r>
+                <a:r>
+                  <a:rPr lang="it-IT" dirty="0"/>
+                  <a:t> </a:t>
+                </a:r>
+                <a:r>
+                  <a:rPr lang="it-IT" dirty="0" err="1"/>
+                  <a:t>created</a:t>
+                </a:r>
+                <a:r>
+                  <a:rPr lang="it-IT" dirty="0"/>
+                  <a:t> with the </a:t>
+                </a:r>
+                <a:r>
+                  <a:rPr lang="it-IT" dirty="0" err="1"/>
+                  <a:t>following</a:t>
+                </a:r>
+                <a:r>
+                  <a:rPr lang="it-IT" dirty="0"/>
+                  <a:t> </a:t>
+                </a:r>
+                <a:r>
+                  <a:rPr lang="it-IT" dirty="0" err="1"/>
+                  <a:t>functions</a:t>
+                </a:r>
+                <a:r>
+                  <a:rPr lang="it-IT" dirty="0"/>
+                  <a:t>:</a:t>
                 </a:r>
               </a:p>
               <a:p>
@@ -4950,8 +5033,48 @@
                   <a:buChar char="§"/>
                 </a:pPr>
                 <a:r>
-                  <a:rPr lang="it-IT" smtClean="0"/>
-                  <a:t> monitor the sensor voltage (analogRead) every 0.5 s;</a:t>
+                  <a:rPr lang="it-IT" dirty="0"/>
+                  <a:t> monitor the </a:t>
+                </a:r>
+                <a:r>
+                  <a:rPr lang="it-IT" dirty="0" err="1"/>
+                  <a:t>sensor</a:t>
+                </a:r>
+                <a:r>
+                  <a:rPr lang="it-IT" dirty="0"/>
+                  <a:t> </a:t>
+                </a:r>
+                <a:r>
+                  <a:rPr lang="it-IT" dirty="0" err="1"/>
+                  <a:t>voltage</a:t>
+                </a:r>
+                <a:r>
+                  <a:rPr lang="it-IT" dirty="0"/>
+                  <a:t> (</a:t>
+                </a:r>
+                <a:r>
+                  <a:rPr lang="it-IT" dirty="0" err="1"/>
+                  <a:t>analogRead</a:t>
+                </a:r>
+                <a:r>
+                  <a:rPr lang="it-IT" dirty="0"/>
+                  <a:t>) </a:t>
+                </a:r>
+                <a:r>
+                  <a:rPr lang="it-IT" dirty="0" err="1"/>
+                  <a:t>every</a:t>
+                </a:r>
+                <a:r>
+                  <a:rPr lang="it-IT" dirty="0"/>
+                  <a:t> 0.5 </a:t>
+                </a:r>
+                <a:r>
+                  <a:rPr lang="it-IT" dirty="0" err="1"/>
+                  <a:t>s</a:t>
+                </a:r>
+                <a:r>
+                  <a:rPr lang="it-IT" dirty="0"/>
+                  <a:t>;</a:t>
                 </a:r>
               </a:p>
               <a:p>
@@ -4960,12 +5083,104 @@
                   <a:buChar char="§"/>
                 </a:pPr>
                 <a:r>
-                  <a:rPr lang="it-IT"/>
+                  <a:rPr lang="it-IT" dirty="0"/>
                   <a:t> </a:t>
                 </a:r>
                 <a:r>
-                  <a:rPr lang="it-IT" smtClean="0"/>
-                  <a:t>switch on and off two water pumps through two digital pins if the voltage goes outside the range </a:t>
+                  <a:rPr lang="it-IT" dirty="0" err="1"/>
+                  <a:t>switch</a:t>
+                </a:r>
+                <a:r>
+                  <a:rPr lang="it-IT" dirty="0"/>
+                  <a:t> on and off </a:t>
+                </a:r>
+                <a:r>
+                  <a:rPr lang="it-IT" dirty="0" err="1"/>
+                  <a:t>two</a:t>
+                </a:r>
+                <a:r>
+                  <a:rPr lang="it-IT" dirty="0"/>
+                  <a:t> water </a:t>
+                </a:r>
+                <a:r>
+                  <a:rPr lang="it-IT" dirty="0" err="1"/>
+                  <a:t>pumps</a:t>
+                </a:r>
+                <a:r>
+                  <a:rPr lang="it-IT" dirty="0"/>
+                  <a:t> </a:t>
+                </a:r>
+                <a:r>
+                  <a:rPr lang="it-IT" dirty="0" err="1"/>
+                  <a:t>through</a:t>
+                </a:r>
+                <a:r>
+                  <a:rPr lang="it-IT" dirty="0"/>
+                  <a:t> </a:t>
+                </a:r>
+                <a:r>
+                  <a:rPr lang="it-IT" dirty="0" err="1"/>
+                  <a:t>two</a:t>
+                </a:r>
+                <a:r>
+                  <a:rPr lang="it-IT" dirty="0"/>
+                  <a:t> </a:t>
+                </a:r>
+                <a:r>
+                  <a:rPr lang="it-IT" dirty="0" err="1"/>
+                  <a:t>digital</a:t>
+                </a:r>
+                <a:r>
+                  <a:rPr lang="it-IT" dirty="0"/>
+                  <a:t> </a:t>
+                </a:r>
+                <a:r>
+                  <a:rPr lang="it-IT" dirty="0" err="1"/>
+                  <a:t>pins</a:t>
+                </a:r>
+                <a:r>
+                  <a:rPr lang="it-IT" dirty="0"/>
+                  <a:t> </a:t>
+                </a:r>
+                <a:r>
+                  <a:rPr lang="it-IT" dirty="0" err="1"/>
+                  <a:t>if</a:t>
+                </a:r>
+                <a:r>
+                  <a:rPr lang="it-IT" dirty="0"/>
+                  <a:t> the </a:t>
+                </a:r>
+                <a:r>
+                  <a:rPr lang="it-IT" dirty="0" err="1"/>
+                  <a:t>voltage</a:t>
+                </a:r>
+                <a:r>
+                  <a:rPr lang="it-IT" dirty="0"/>
+                  <a:t> </a:t>
+                </a:r>
+                <a:r>
+                  <a:rPr lang="it-IT" dirty="0" err="1"/>
+                  <a:t>goes</a:t>
+                </a:r>
+                <a:r>
+                  <a:rPr lang="it-IT" dirty="0"/>
+                  <a:t> </a:t>
+                </a:r>
+                <a:r>
+                  <a:rPr lang="it-IT" dirty="0" err="1"/>
+                  <a:t>outside</a:t>
+                </a:r>
+                <a:r>
+                  <a:rPr lang="it-IT" dirty="0"/>
+                  <a:t> the </a:t>
+                </a:r>
+                <a:r>
+                  <a:rPr lang="it-IT" dirty="0" err="1"/>
+                  <a:t>range</a:t>
+                </a:r>
+                <a:r>
+                  <a:rPr lang="it-IT" dirty="0"/>
+                  <a:t> </a:t>
                 </a:r>
                 <a14:m>
                   <m:oMath xmlns:m="http://schemas.openxmlformats.org/officeDocument/2006/math">
@@ -5040,7 +5255,7 @@
                   </m:oMath>
                 </a14:m>
                 <a:r>
-                  <a:rPr lang="it-IT" smtClean="0"/>
+                  <a:rPr lang="it-IT" dirty="0"/>
                   <a:t>;</a:t>
                 </a:r>
               </a:p>
@@ -5050,18 +5265,38 @@
                   <a:buChar char="§"/>
                 </a:pPr>
                 <a:r>
-                  <a:rPr lang="it-IT"/>
+                  <a:rPr lang="it-IT" dirty="0"/>
                   <a:t> </a:t>
                 </a:r>
                 <a:r>
-                  <a:rPr lang="it-IT" smtClean="0"/>
-                  <a:t>acquire and save data on a csv file.</a:t>
+                  <a:rPr lang="it-IT" dirty="0" err="1"/>
+                  <a:t>acquire</a:t>
+                </a:r>
+                <a:r>
+                  <a:rPr lang="it-IT" dirty="0"/>
+                  <a:t> and </a:t>
+                </a:r>
+                <a:r>
+                  <a:rPr lang="it-IT" dirty="0" err="1"/>
+                  <a:t>save</a:t>
+                </a:r>
+                <a:r>
+                  <a:rPr lang="it-IT" dirty="0"/>
+                  <a:t> data on a </a:t>
+                </a:r>
+                <a:r>
+                  <a:rPr lang="it-IT" dirty="0" err="1"/>
+                  <a:t>csv</a:t>
+                </a:r>
+                <a:r>
+                  <a:rPr lang="it-IT" dirty="0"/>
+                  <a:t> file.</a:t>
                 </a:r>
               </a:p>
             </p:txBody>
           </p:sp>
         </mc:Choice>
-        <mc:Fallback>
+        <mc:Fallback xmlns="">
           <p:sp>
             <p:nvSpPr>
               <p:cNvPr id="3" name="Segnaposto contenuto 2"/>
@@ -5180,10 +5415,22 @@
           <a:lstStyle/>
           <a:p>
             <a:r>
-              <a:rPr lang="it-IT" smtClean="0"/>
-              <a:t>Preliminary analysis and offset problem</a:t>
-            </a:r>
-            <a:endParaRPr lang="en-US"/>
+              <a:rPr lang="it-IT" dirty="0"/>
+              <a:t>Preliminary </a:t>
+            </a:r>
+            <a:r>
+              <a:rPr lang="it-IT" dirty="0" err="1"/>
+              <a:t>analysis</a:t>
+            </a:r>
+            <a:r>
+              <a:rPr lang="it-IT" dirty="0"/>
+              <a:t> and offset </a:t>
+            </a:r>
+            <a:r>
+              <a:rPr lang="it-IT" dirty="0" err="1"/>
+              <a:t>problem</a:t>
+            </a:r>
+            <a:endParaRPr lang="en-US" dirty="0"/>
           </a:p>
         </p:txBody>
       </p:sp>
@@ -5213,7 +5460,7 @@
               <a:buNone/>
             </a:pPr>
             <a:r>
-              <a:rPr lang="it-IT" smtClean="0"/>
+              <a:rPr lang="it-IT"/>
               <a:t>The experiment has initially been run without pumps and a positive offset in the analogRead has been evidenced when the digital pins output a current on the transistors’ bases. </a:t>
             </a:r>
           </a:p>
@@ -5222,7 +5469,7 @@
               <a:buNone/>
             </a:pPr>
             <a:r>
-              <a:rPr lang="it-IT" smtClean="0"/>
+              <a:rPr lang="it-IT"/>
               <a:t>This offset, initially ~ 50 mV, has been reduced to ~ 20-30 mV with the use of potentiometers to create a resistance on the transistors’ bases, but it could not be removed. </a:t>
             </a:r>
           </a:p>

</xml_diff>

<commit_message>
changes in the presentation
</commit_message>
<xml_diff>
--- a/Presentation.pptx
+++ b/Presentation.pptx
@@ -5,7 +5,7 @@
     <p:sldMasterId id="2147483660" r:id="rId1"/>
   </p:sldMasterIdLst>
   <p:notesMasterIdLst>
-    <p:notesMasterId r:id="rId18"/>
+    <p:notesMasterId r:id="rId20"/>
   </p:notesMasterIdLst>
   <p:sldIdLst>
     <p:sldId id="256" r:id="rId2"/>
@@ -23,7 +23,9 @@
     <p:sldId id="268" r:id="rId14"/>
     <p:sldId id="269" r:id="rId15"/>
     <p:sldId id="270" r:id="rId16"/>
-    <p:sldId id="271" r:id="rId17"/>
+    <p:sldId id="272" r:id="rId17"/>
+    <p:sldId id="273" r:id="rId18"/>
+    <p:sldId id="271" r:id="rId19"/>
   </p:sldIdLst>
   <p:sldSz cx="12192000" cy="6858000"/>
   <p:notesSz cx="6858000" cy="9144000"/>
@@ -6810,6 +6812,684 @@
 </file>
 
 <file path=ppt/slides/slide16.xml><?xml version="1.0" encoding="utf-8"?>
+<p:sld xmlns:a="http://schemas.openxmlformats.org/drawingml/2006/main" xmlns:r="http://schemas.openxmlformats.org/officeDocument/2006/relationships" xmlns:p="http://schemas.openxmlformats.org/presentationml/2006/main">
+  <p:cSld>
+    <p:spTree>
+      <p:nvGrpSpPr>
+        <p:cNvPr id="1" name=""/>
+        <p:cNvGrpSpPr/>
+        <p:nvPr/>
+      </p:nvGrpSpPr>
+      <p:grpSpPr>
+        <a:xfrm>
+          <a:off x="0" y="0"/>
+          <a:ext cx="0" cy="0"/>
+          <a:chOff x="0" y="0"/>
+          <a:chExt cx="0" cy="0"/>
+        </a:xfrm>
+      </p:grpSpPr>
+      <p:sp>
+        <p:nvSpPr>
+          <p:cNvPr id="2" name="Title 1">
+            <a:extLst>
+              <a:ext uri="{FF2B5EF4-FFF2-40B4-BE49-F238E27FC236}">
+                <a16:creationId xmlns:a16="http://schemas.microsoft.com/office/drawing/2014/main" id="{6B82FE63-5413-2D43-A916-67864D4110F7}"/>
+              </a:ext>
+            </a:extLst>
+          </p:cNvPr>
+          <p:cNvSpPr>
+            <a:spLocks noGrp="1"/>
+          </p:cNvSpPr>
+          <p:nvPr>
+            <p:ph type="title"/>
+          </p:nvPr>
+        </p:nvSpPr>
+        <p:spPr>
+          <a:xfrm>
+            <a:off x="685800" y="-124090"/>
+            <a:ext cx="10772775" cy="1658198"/>
+          </a:xfrm>
+        </p:spPr>
+        <p:txBody>
+          <a:bodyPr/>
+          <a:lstStyle/>
+          <a:p>
+            <a:pPr algn="ctr"/>
+            <a:r>
+              <a:rPr lang="it-IT" dirty="0"/>
+              <a:t>Full feedback plot </a:t>
+            </a:r>
+          </a:p>
+        </p:txBody>
+      </p:sp>
+      <p:sp>
+        <p:nvSpPr>
+          <p:cNvPr id="4" name="Footer Placeholder 3">
+            <a:extLst>
+              <a:ext uri="{FF2B5EF4-FFF2-40B4-BE49-F238E27FC236}">
+                <a16:creationId xmlns:a16="http://schemas.microsoft.com/office/drawing/2014/main" id="{05830F60-9A23-A449-8C2E-B0F9AA9785CE}"/>
+              </a:ext>
+            </a:extLst>
+          </p:cNvPr>
+          <p:cNvSpPr>
+            <a:spLocks noGrp="1"/>
+          </p:cNvSpPr>
+          <p:nvPr>
+            <p:ph type="ftr" sz="quarter" idx="11"/>
+          </p:nvPr>
+        </p:nvSpPr>
+        <p:spPr/>
+        <p:txBody>
+          <a:bodyPr/>
+          <a:lstStyle/>
+          <a:p>
+            <a:r>
+              <a:rPr lang="en-US"/>
+              <a:t>Niccolò Ciavarelli, Alessandro Mancini</a:t>
+            </a:r>
+          </a:p>
+        </p:txBody>
+      </p:sp>
+      <p:sp>
+        <p:nvSpPr>
+          <p:cNvPr id="5" name="Slide Number Placeholder 4">
+            <a:extLst>
+              <a:ext uri="{FF2B5EF4-FFF2-40B4-BE49-F238E27FC236}">
+                <a16:creationId xmlns:a16="http://schemas.microsoft.com/office/drawing/2014/main" id="{3DFFEF5F-1EE7-9F47-A55D-9EE5C30A9D08}"/>
+              </a:ext>
+            </a:extLst>
+          </p:cNvPr>
+          <p:cNvSpPr>
+            <a:spLocks noGrp="1"/>
+          </p:cNvSpPr>
+          <p:nvPr>
+            <p:ph type="sldNum" sz="quarter" idx="12"/>
+          </p:nvPr>
+        </p:nvSpPr>
+        <p:spPr/>
+        <p:txBody>
+          <a:bodyPr/>
+          <a:lstStyle/>
+          <a:p>
+            <a:fld id="{ABE17D80-2DC1-4B61-A42F-CD3D496E699C}" type="slidenum">
+              <a:rPr lang="en-US" smtClean="0"/>
+              <a:t>16</a:t>
+            </a:fld>
+            <a:endParaRPr lang="en-US"/>
+          </a:p>
+        </p:txBody>
+      </p:sp>
+      <p:pic>
+        <p:nvPicPr>
+          <p:cNvPr id="7" name="Picture 6">
+            <a:extLst>
+              <a:ext uri="{FF2B5EF4-FFF2-40B4-BE49-F238E27FC236}">
+                <a16:creationId xmlns:a16="http://schemas.microsoft.com/office/drawing/2014/main" id="{BFD2209A-9742-5744-BC43-97CACA333CD7}"/>
+              </a:ext>
+            </a:extLst>
+          </p:cNvPr>
+          <p:cNvPicPr>
+            <a:picLocks noChangeAspect="1"/>
+          </p:cNvPicPr>
+          <p:nvPr/>
+        </p:nvPicPr>
+        <p:blipFill>
+          <a:blip r:embed="rId2">
+            <a:extLst>
+              <a:ext uri="{28A0092B-C50C-407E-A947-70E740481C1C}">
+                <a14:useLocalDpi xmlns:a14="http://schemas.microsoft.com/office/drawing/2010/main" val="0"/>
+              </a:ext>
+            </a:extLst>
+          </a:blip>
+          <a:stretch>
+            <a:fillRect/>
+          </a:stretch>
+        </p:blipFill>
+        <p:spPr>
+          <a:xfrm rot="5400000">
+            <a:off x="3773714" y="92600"/>
+            <a:ext cx="4644571" cy="6858000"/>
+          </a:xfrm>
+          <a:prstGeom prst="rect">
+            <a:avLst/>
+          </a:prstGeom>
+        </p:spPr>
+      </p:pic>
+      <p:sp>
+        <p:nvSpPr>
+          <p:cNvPr id="8" name="TextBox 7">
+            <a:extLst>
+              <a:ext uri="{FF2B5EF4-FFF2-40B4-BE49-F238E27FC236}">
+                <a16:creationId xmlns:a16="http://schemas.microsoft.com/office/drawing/2014/main" id="{FCCAA389-23D4-964D-AAF2-75E64F1E0D2D}"/>
+              </a:ext>
+            </a:extLst>
+          </p:cNvPr>
+          <p:cNvSpPr txBox="1"/>
+          <p:nvPr/>
+        </p:nvSpPr>
+        <p:spPr>
+          <a:xfrm>
+            <a:off x="881951" y="1534108"/>
+            <a:ext cx="1588897" cy="369332"/>
+          </a:xfrm>
+          <a:prstGeom prst="rect">
+            <a:avLst/>
+          </a:prstGeom>
+          <a:noFill/>
+        </p:spPr>
+        <p:txBody>
+          <a:bodyPr wrap="none" rtlCol="0">
+            <a:spAutoFit/>
+          </a:bodyPr>
+          <a:lstStyle/>
+          <a:p>
+            <a:pPr marL="285750" indent="-285750">
+              <a:buFont typeface="Arial" panose="020B0604020202020204" pitchFamily="34" charset="0"/>
+              <a:buChar char="•"/>
+            </a:pPr>
+            <a:r>
+              <a:rPr lang="it-IT" dirty="0"/>
+              <a:t>V</a:t>
+            </a:r>
+            <a:r>
+              <a:rPr lang="it-IT" baseline="-25000" dirty="0"/>
+              <a:t>HIGH</a:t>
+            </a:r>
+            <a:r>
+              <a:rPr lang="it-IT" dirty="0"/>
+              <a:t> = 2.0 v</a:t>
+            </a:r>
+          </a:p>
+        </p:txBody>
+      </p:sp>
+      <p:sp>
+        <p:nvSpPr>
+          <p:cNvPr id="9" name="TextBox 8">
+            <a:extLst>
+              <a:ext uri="{FF2B5EF4-FFF2-40B4-BE49-F238E27FC236}">
+                <a16:creationId xmlns:a16="http://schemas.microsoft.com/office/drawing/2014/main" id="{C41482C3-109D-DE4D-886D-516BC4990129}"/>
+              </a:ext>
+            </a:extLst>
+          </p:cNvPr>
+          <p:cNvSpPr txBox="1"/>
+          <p:nvPr/>
+        </p:nvSpPr>
+        <p:spPr>
+          <a:xfrm>
+            <a:off x="9525000" y="1520181"/>
+            <a:ext cx="1562800" cy="369332"/>
+          </a:xfrm>
+          <a:prstGeom prst="rect">
+            <a:avLst/>
+          </a:prstGeom>
+          <a:noFill/>
+        </p:spPr>
+        <p:txBody>
+          <a:bodyPr wrap="none" rtlCol="0">
+            <a:spAutoFit/>
+          </a:bodyPr>
+          <a:lstStyle/>
+          <a:p>
+            <a:pPr marL="285750" indent="-285750">
+              <a:buFont typeface="Arial" panose="020B0604020202020204" pitchFamily="34" charset="0"/>
+              <a:buChar char="•"/>
+            </a:pPr>
+            <a:r>
+              <a:rPr lang="it-IT" dirty="0"/>
+              <a:t>V</a:t>
+            </a:r>
+            <a:r>
+              <a:rPr lang="it-IT" baseline="-25000" dirty="0"/>
+              <a:t>LOW</a:t>
+            </a:r>
+            <a:r>
+              <a:rPr lang="it-IT" dirty="0"/>
+              <a:t> = 2.0 v</a:t>
+            </a:r>
+          </a:p>
+        </p:txBody>
+      </p:sp>
+      <p:cxnSp>
+        <p:nvCxnSpPr>
+          <p:cNvPr id="11" name="Straight Connector 10">
+            <a:extLst>
+              <a:ext uri="{FF2B5EF4-FFF2-40B4-BE49-F238E27FC236}">
+                <a16:creationId xmlns:a16="http://schemas.microsoft.com/office/drawing/2014/main" id="{E27DE1F7-8184-2546-924A-5492A5BB7BE3}"/>
+              </a:ext>
+            </a:extLst>
+          </p:cNvPr>
+          <p:cNvCxnSpPr/>
+          <p:nvPr/>
+        </p:nvCxnSpPr>
+        <p:spPr>
+          <a:xfrm>
+            <a:off x="2694970" y="4375230"/>
+            <a:ext cx="0" cy="717631"/>
+          </a:xfrm>
+          <a:prstGeom prst="line">
+            <a:avLst/>
+          </a:prstGeom>
+          <a:ln w="19050" cap="flat" cmpd="sng" algn="ctr">
+            <a:solidFill>
+              <a:schemeClr val="dk1"/>
+            </a:solidFill>
+            <a:prstDash val="solid"/>
+            <a:round/>
+            <a:headEnd type="arrow" w="med" len="med"/>
+            <a:tailEnd type="arrow" w="med" len="med"/>
+          </a:ln>
+        </p:spPr>
+        <p:style>
+          <a:lnRef idx="0">
+            <a:scrgbClr r="0" g="0" b="0"/>
+          </a:lnRef>
+          <a:fillRef idx="0">
+            <a:scrgbClr r="0" g="0" b="0"/>
+          </a:fillRef>
+          <a:effectRef idx="0">
+            <a:scrgbClr r="0" g="0" b="0"/>
+          </a:effectRef>
+          <a:fontRef idx="minor">
+            <a:schemeClr val="tx1"/>
+          </a:fontRef>
+        </p:style>
+      </p:cxnSp>
+      <p:sp>
+        <p:nvSpPr>
+          <p:cNvPr id="12" name="TextBox 11">
+            <a:extLst>
+              <a:ext uri="{FF2B5EF4-FFF2-40B4-BE49-F238E27FC236}">
+                <a16:creationId xmlns:a16="http://schemas.microsoft.com/office/drawing/2014/main" id="{07CE602F-F254-F84B-B475-053D7BAEC276}"/>
+              </a:ext>
+            </a:extLst>
+          </p:cNvPr>
+          <p:cNvSpPr txBox="1"/>
+          <p:nvPr/>
+        </p:nvSpPr>
+        <p:spPr>
+          <a:xfrm>
+            <a:off x="1450063" y="4585229"/>
+            <a:ext cx="1216936" cy="369332"/>
+          </a:xfrm>
+          <a:prstGeom prst="rect">
+            <a:avLst/>
+          </a:prstGeom>
+          <a:noFill/>
+        </p:spPr>
+        <p:txBody>
+          <a:bodyPr wrap="none" rtlCol="0">
+            <a:spAutoFit/>
+          </a:bodyPr>
+          <a:lstStyle/>
+          <a:p>
+            <a:r>
+              <a:rPr lang="it-IT" dirty="0" err="1"/>
+              <a:t>Safe</a:t>
+            </a:r>
+            <a:r>
+              <a:rPr lang="it-IT" dirty="0"/>
+              <a:t> </a:t>
+            </a:r>
+            <a:r>
+              <a:rPr lang="it-IT" dirty="0" err="1"/>
+              <a:t>region</a:t>
+            </a:r>
+            <a:endParaRPr lang="it-IT" dirty="0"/>
+          </a:p>
+        </p:txBody>
+      </p:sp>
+      <p:pic>
+        <p:nvPicPr>
+          <p:cNvPr id="13" name="Picture 12" descr="A colorful diagram and pie chart&#10;&#10;Description automatically generated">
+            <a:extLst>
+              <a:ext uri="{FF2B5EF4-FFF2-40B4-BE49-F238E27FC236}">
+                <a16:creationId xmlns:a16="http://schemas.microsoft.com/office/drawing/2014/main" id="{A4209FE8-E65A-9F43-84E9-F8472E5987AA}"/>
+              </a:ext>
+            </a:extLst>
+          </p:cNvPr>
+          <p:cNvPicPr>
+            <a:picLocks noChangeAspect="1"/>
+          </p:cNvPicPr>
+          <p:nvPr/>
+        </p:nvPicPr>
+        <p:blipFill>
+          <a:blip r:embed="rId3">
+            <a:extLst>
+              <a:ext uri="{28A0092B-C50C-407E-A947-70E740481C1C}">
+                <a14:useLocalDpi xmlns:a14="http://schemas.microsoft.com/office/drawing/2010/main" val="0"/>
+              </a:ext>
+            </a:extLst>
+          </a:blip>
+          <a:stretch>
+            <a:fillRect/>
+          </a:stretch>
+        </p:blipFill>
+        <p:spPr>
+          <a:xfrm>
+            <a:off x="11085190" y="74919"/>
+            <a:ext cx="863882" cy="863882"/>
+          </a:xfrm>
+          <a:prstGeom prst="rect">
+            <a:avLst/>
+          </a:prstGeom>
+        </p:spPr>
+      </p:pic>
+    </p:spTree>
+    <p:extLst>
+      <p:ext uri="{BB962C8B-B14F-4D97-AF65-F5344CB8AC3E}">
+        <p14:creationId xmlns:p14="http://schemas.microsoft.com/office/powerpoint/2010/main" val="2898144076"/>
+      </p:ext>
+    </p:extLst>
+  </p:cSld>
+  <p:clrMapOvr>
+    <a:masterClrMapping/>
+  </p:clrMapOvr>
+</p:sld>
+</file>
+
+<file path=ppt/slides/slide17.xml><?xml version="1.0" encoding="utf-8"?>
+<p:sld xmlns:a="http://schemas.openxmlformats.org/drawingml/2006/main" xmlns:r="http://schemas.openxmlformats.org/officeDocument/2006/relationships" xmlns:p="http://schemas.openxmlformats.org/presentationml/2006/main">
+  <p:cSld>
+    <p:spTree>
+      <p:nvGrpSpPr>
+        <p:cNvPr id="1" name=""/>
+        <p:cNvGrpSpPr/>
+        <p:nvPr/>
+      </p:nvGrpSpPr>
+      <p:grpSpPr>
+        <a:xfrm>
+          <a:off x="0" y="0"/>
+          <a:ext cx="0" cy="0"/>
+          <a:chOff x="0" y="0"/>
+          <a:chExt cx="0" cy="0"/>
+        </a:xfrm>
+      </p:grpSpPr>
+      <p:sp>
+        <p:nvSpPr>
+          <p:cNvPr id="2" name="Title 1">
+            <a:extLst>
+              <a:ext uri="{FF2B5EF4-FFF2-40B4-BE49-F238E27FC236}">
+                <a16:creationId xmlns:a16="http://schemas.microsoft.com/office/drawing/2014/main" id="{6B82FE63-5413-2D43-A916-67864D4110F7}"/>
+              </a:ext>
+            </a:extLst>
+          </p:cNvPr>
+          <p:cNvSpPr>
+            <a:spLocks noGrp="1"/>
+          </p:cNvSpPr>
+          <p:nvPr>
+            <p:ph type="title"/>
+          </p:nvPr>
+        </p:nvSpPr>
+        <p:spPr>
+          <a:xfrm>
+            <a:off x="685800" y="-124090"/>
+            <a:ext cx="10772775" cy="1658198"/>
+          </a:xfrm>
+        </p:spPr>
+        <p:txBody>
+          <a:bodyPr>
+            <a:normAutofit/>
+          </a:bodyPr>
+          <a:lstStyle/>
+          <a:p>
+            <a:pPr algn="ctr"/>
+            <a:r>
+              <a:rPr lang="it-IT" sz="4400" dirty="0"/>
+              <a:t>Zoom of the full feedback plot in the </a:t>
+            </a:r>
+            <a:r>
+              <a:rPr lang="it-IT" sz="4400" dirty="0" err="1"/>
+              <a:t>safe</a:t>
+            </a:r>
+            <a:r>
+              <a:rPr lang="it-IT" sz="4400" dirty="0"/>
+              <a:t> </a:t>
+            </a:r>
+            <a:r>
+              <a:rPr lang="it-IT" sz="4400" dirty="0" err="1"/>
+              <a:t>region</a:t>
+            </a:r>
+            <a:endParaRPr lang="it-IT" sz="4400" dirty="0"/>
+          </a:p>
+        </p:txBody>
+      </p:sp>
+      <p:sp>
+        <p:nvSpPr>
+          <p:cNvPr id="4" name="Footer Placeholder 3">
+            <a:extLst>
+              <a:ext uri="{FF2B5EF4-FFF2-40B4-BE49-F238E27FC236}">
+                <a16:creationId xmlns:a16="http://schemas.microsoft.com/office/drawing/2014/main" id="{05830F60-9A23-A449-8C2E-B0F9AA9785CE}"/>
+              </a:ext>
+            </a:extLst>
+          </p:cNvPr>
+          <p:cNvSpPr>
+            <a:spLocks noGrp="1"/>
+          </p:cNvSpPr>
+          <p:nvPr>
+            <p:ph type="ftr" sz="quarter" idx="11"/>
+          </p:nvPr>
+        </p:nvSpPr>
+        <p:spPr/>
+        <p:txBody>
+          <a:bodyPr/>
+          <a:lstStyle/>
+          <a:p>
+            <a:r>
+              <a:rPr lang="en-US"/>
+              <a:t>Niccolò Ciavarelli, Alessandro Mancini</a:t>
+            </a:r>
+          </a:p>
+        </p:txBody>
+      </p:sp>
+      <p:sp>
+        <p:nvSpPr>
+          <p:cNvPr id="5" name="Slide Number Placeholder 4">
+            <a:extLst>
+              <a:ext uri="{FF2B5EF4-FFF2-40B4-BE49-F238E27FC236}">
+                <a16:creationId xmlns:a16="http://schemas.microsoft.com/office/drawing/2014/main" id="{3DFFEF5F-1EE7-9F47-A55D-9EE5C30A9D08}"/>
+              </a:ext>
+            </a:extLst>
+          </p:cNvPr>
+          <p:cNvSpPr>
+            <a:spLocks noGrp="1"/>
+          </p:cNvSpPr>
+          <p:nvPr>
+            <p:ph type="sldNum" sz="quarter" idx="12"/>
+          </p:nvPr>
+        </p:nvSpPr>
+        <p:spPr/>
+        <p:txBody>
+          <a:bodyPr/>
+          <a:lstStyle/>
+          <a:p>
+            <a:fld id="{ABE17D80-2DC1-4B61-A42F-CD3D496E699C}" type="slidenum">
+              <a:rPr lang="en-US" smtClean="0"/>
+              <a:t>17</a:t>
+            </a:fld>
+            <a:endParaRPr lang="en-US"/>
+          </a:p>
+        </p:txBody>
+      </p:sp>
+      <p:sp>
+        <p:nvSpPr>
+          <p:cNvPr id="8" name="TextBox 7">
+            <a:extLst>
+              <a:ext uri="{FF2B5EF4-FFF2-40B4-BE49-F238E27FC236}">
+                <a16:creationId xmlns:a16="http://schemas.microsoft.com/office/drawing/2014/main" id="{FCCAA389-23D4-964D-AAF2-75E64F1E0D2D}"/>
+              </a:ext>
+            </a:extLst>
+          </p:cNvPr>
+          <p:cNvSpPr txBox="1"/>
+          <p:nvPr/>
+        </p:nvSpPr>
+        <p:spPr>
+          <a:xfrm>
+            <a:off x="881951" y="1534108"/>
+            <a:ext cx="1588897" cy="369332"/>
+          </a:xfrm>
+          <a:prstGeom prst="rect">
+            <a:avLst/>
+          </a:prstGeom>
+          <a:noFill/>
+        </p:spPr>
+        <p:txBody>
+          <a:bodyPr wrap="none" rtlCol="0">
+            <a:spAutoFit/>
+          </a:bodyPr>
+          <a:lstStyle/>
+          <a:p>
+            <a:pPr marL="285750" indent="-285750">
+              <a:buFont typeface="Arial" panose="020B0604020202020204" pitchFamily="34" charset="0"/>
+              <a:buChar char="•"/>
+            </a:pPr>
+            <a:r>
+              <a:rPr lang="it-IT" dirty="0"/>
+              <a:t>V</a:t>
+            </a:r>
+            <a:r>
+              <a:rPr lang="it-IT" baseline="-25000" dirty="0"/>
+              <a:t>HIGH</a:t>
+            </a:r>
+            <a:r>
+              <a:rPr lang="it-IT" dirty="0"/>
+              <a:t> = 2.0 v</a:t>
+            </a:r>
+          </a:p>
+        </p:txBody>
+      </p:sp>
+      <p:sp>
+        <p:nvSpPr>
+          <p:cNvPr id="9" name="TextBox 8">
+            <a:extLst>
+              <a:ext uri="{FF2B5EF4-FFF2-40B4-BE49-F238E27FC236}">
+                <a16:creationId xmlns:a16="http://schemas.microsoft.com/office/drawing/2014/main" id="{C41482C3-109D-DE4D-886D-516BC4990129}"/>
+              </a:ext>
+            </a:extLst>
+          </p:cNvPr>
+          <p:cNvSpPr txBox="1"/>
+          <p:nvPr/>
+        </p:nvSpPr>
+        <p:spPr>
+          <a:xfrm>
+            <a:off x="9525000" y="1520181"/>
+            <a:ext cx="1562800" cy="369332"/>
+          </a:xfrm>
+          <a:prstGeom prst="rect">
+            <a:avLst/>
+          </a:prstGeom>
+          <a:noFill/>
+        </p:spPr>
+        <p:txBody>
+          <a:bodyPr wrap="none" rtlCol="0">
+            <a:spAutoFit/>
+          </a:bodyPr>
+          <a:lstStyle/>
+          <a:p>
+            <a:pPr marL="285750" indent="-285750">
+              <a:buFont typeface="Arial" panose="020B0604020202020204" pitchFamily="34" charset="0"/>
+              <a:buChar char="•"/>
+            </a:pPr>
+            <a:r>
+              <a:rPr lang="it-IT" dirty="0"/>
+              <a:t>V</a:t>
+            </a:r>
+            <a:r>
+              <a:rPr lang="it-IT" baseline="-25000" dirty="0"/>
+              <a:t>LOW</a:t>
+            </a:r>
+            <a:r>
+              <a:rPr lang="it-IT" dirty="0"/>
+              <a:t> = 2.0 v</a:t>
+            </a:r>
+          </a:p>
+        </p:txBody>
+      </p:sp>
+      <p:pic>
+        <p:nvPicPr>
+          <p:cNvPr id="6" name="Picture 5">
+            <a:extLst>
+              <a:ext uri="{FF2B5EF4-FFF2-40B4-BE49-F238E27FC236}">
+                <a16:creationId xmlns:a16="http://schemas.microsoft.com/office/drawing/2014/main" id="{B1725F2A-46E7-3742-B11F-1B60B9993A94}"/>
+              </a:ext>
+            </a:extLst>
+          </p:cNvPr>
+          <p:cNvPicPr>
+            <a:picLocks noChangeAspect="1"/>
+          </p:cNvPicPr>
+          <p:nvPr/>
+        </p:nvPicPr>
+        <p:blipFill>
+          <a:blip r:embed="rId2">
+            <a:extLst>
+              <a:ext uri="{28A0092B-C50C-407E-A947-70E740481C1C}">
+                <a14:useLocalDpi xmlns:a14="http://schemas.microsoft.com/office/drawing/2010/main" val="0"/>
+              </a:ext>
+            </a:extLst>
+          </a:blip>
+          <a:stretch>
+            <a:fillRect/>
+          </a:stretch>
+        </p:blipFill>
+        <p:spPr>
+          <a:xfrm rot="5400000">
+            <a:off x="3773714" y="0"/>
+            <a:ext cx="4644571" cy="6858000"/>
+          </a:xfrm>
+          <a:prstGeom prst="rect">
+            <a:avLst/>
+          </a:prstGeom>
+        </p:spPr>
+      </p:pic>
+      <p:pic>
+        <p:nvPicPr>
+          <p:cNvPr id="11" name="Picture 10" descr="A magnifying glass with a black background&#10;&#10;Description automatically generated">
+            <a:extLst>
+              <a:ext uri="{FF2B5EF4-FFF2-40B4-BE49-F238E27FC236}">
+                <a16:creationId xmlns:a16="http://schemas.microsoft.com/office/drawing/2014/main" id="{7A961A40-FBB8-7149-A783-54B5F2A17EA2}"/>
+              </a:ext>
+            </a:extLst>
+          </p:cNvPr>
+          <p:cNvPicPr>
+            <a:picLocks noChangeAspect="1"/>
+          </p:cNvPicPr>
+          <p:nvPr/>
+        </p:nvPicPr>
+        <p:blipFill>
+          <a:blip r:embed="rId3">
+            <a:extLst>
+              <a:ext uri="{28A0092B-C50C-407E-A947-70E740481C1C}">
+                <a14:useLocalDpi xmlns:a14="http://schemas.microsoft.com/office/drawing/2010/main" val="0"/>
+              </a:ext>
+            </a:extLst>
+          </a:blip>
+          <a:stretch>
+            <a:fillRect/>
+          </a:stretch>
+        </p:blipFill>
+        <p:spPr>
+          <a:xfrm>
+            <a:off x="1957941" y="3134244"/>
+            <a:ext cx="781400" cy="781400"/>
+          </a:xfrm>
+          <a:prstGeom prst="rect">
+            <a:avLst/>
+          </a:prstGeom>
+        </p:spPr>
+      </p:pic>
+    </p:spTree>
+    <p:extLst>
+      <p:ext uri="{BB962C8B-B14F-4D97-AF65-F5344CB8AC3E}">
+        <p14:creationId xmlns:p14="http://schemas.microsoft.com/office/powerpoint/2010/main" val="2759019674"/>
+      </p:ext>
+    </p:extLst>
+  </p:cSld>
+  <p:clrMapOvr>
+    <a:masterClrMapping/>
+  </p:clrMapOvr>
+</p:sld>
+</file>
+
+<file path=ppt/slides/slide18.xml><?xml version="1.0" encoding="utf-8"?>
 <p:sld xmlns:a="http://schemas.openxmlformats.org/drawingml/2006/main" xmlns:r="http://schemas.openxmlformats.org/officeDocument/2006/relationships" xmlns:p="http://schemas.openxmlformats.org/presentationml/2006/main">
   <p:cSld>
     <p:spTree>

</xml_diff>

<commit_message>
added the conclusion to the presentation
</commit_message>
<xml_diff>
--- a/Presentation.pptx
+++ b/Presentation.pptx
@@ -5,7 +5,7 @@
     <p:sldMasterId id="2147483660" r:id="rId1"/>
   </p:sldMasterIdLst>
   <p:notesMasterIdLst>
-    <p:notesMasterId r:id="rId20"/>
+    <p:notesMasterId r:id="rId21"/>
   </p:notesMasterIdLst>
   <p:sldIdLst>
     <p:sldId id="256" r:id="rId2"/>
@@ -25,7 +25,8 @@
     <p:sldId id="270" r:id="rId16"/>
     <p:sldId id="272" r:id="rId17"/>
     <p:sldId id="273" r:id="rId18"/>
-    <p:sldId id="271" r:id="rId19"/>
+    <p:sldId id="274" r:id="rId19"/>
+    <p:sldId id="271" r:id="rId20"/>
   </p:sldIdLst>
   <p:sldSz cx="12192000" cy="6858000"/>
   <p:notesSz cx="6858000" cy="9144000"/>
@@ -4398,8 +4399,8 @@
           </a:p>
           <a:p>
             <a:pPr marL="342900" indent="-342900">
-              <a:buFont typeface="Arial" panose="020B0604020202020204" pitchFamily="34" charset="0"/>
-              <a:buChar char="•"/>
+              <a:buFont typeface="Wingdings" pitchFamily="2" charset="2"/>
+              <a:buChar char="§"/>
             </a:pPr>
             <a:r>
               <a:rPr lang="it-IT" sz="2400" dirty="0"/>
@@ -4416,8 +4417,8 @@
           </a:p>
           <a:p>
             <a:pPr marL="342900" indent="-342900">
-              <a:buFont typeface="Arial" panose="020B0604020202020204" pitchFamily="34" charset="0"/>
-              <a:buChar char="•"/>
+              <a:buFont typeface="Wingdings" pitchFamily="2" charset="2"/>
+              <a:buChar char="§"/>
             </a:pPr>
             <a:r>
               <a:rPr lang="it-IT" sz="2400" dirty="0" err="1"/>
@@ -4463,7 +4464,7 @@
         </p:blipFill>
         <p:spPr>
           <a:xfrm>
-            <a:off x="6572298" y="1114695"/>
+            <a:off x="7313079" y="1114695"/>
             <a:ext cx="3685083" cy="4789053"/>
           </a:xfrm>
           <a:prstGeom prst="rect">
@@ -4485,7 +4486,7 @@
         </p:nvSpPr>
         <p:spPr>
           <a:xfrm>
-            <a:off x="7321911" y="5989882"/>
+            <a:off x="8062692" y="5989882"/>
             <a:ext cx="2185855" cy="338554"/>
           </a:xfrm>
           <a:prstGeom prst="rect">
@@ -4729,8 +4730,8 @@
               </a:p>
               <a:p>
                 <a:pPr marL="342900" indent="-342900">
-                  <a:buFont typeface="Arial" panose="020B0604020202020204" pitchFamily="34" charset="0"/>
-                  <a:buChar char="•"/>
+                  <a:buFont typeface="Wingdings" pitchFamily="2" charset="2"/>
+                  <a:buChar char="§"/>
                 </a:pPr>
                 <a:r>
                   <a:rPr lang="it-IT" sz="2400" dirty="0"/>
@@ -4752,8 +4753,8 @@
               </a:p>
               <a:p>
                 <a:pPr marL="342900" indent="-342900">
-                  <a:buFont typeface="Arial" panose="020B0604020202020204" pitchFamily="34" charset="0"/>
-                  <a:buChar char="•"/>
+                  <a:buFont typeface="Wingdings" pitchFamily="2" charset="2"/>
+                  <a:buChar char="§"/>
                 </a:pPr>
                 <a:r>
                   <a:rPr lang="it-IT" sz="2400" dirty="0"/>
@@ -4778,8 +4779,8 @@
               </a:p>
               <a:p>
                 <a:pPr marL="342900" indent="-342900">
-                  <a:buFont typeface="Arial" panose="020B0604020202020204" pitchFamily="34" charset="0"/>
-                  <a:buChar char="•"/>
+                  <a:buFont typeface="Wingdings" pitchFamily="2" charset="2"/>
+                  <a:buChar char="§"/>
                 </a:pPr>
                 <a:r>
                   <a:rPr lang="it-IT" sz="2400" dirty="0"/>
@@ -4920,6 +4921,86 @@
           </a:p>
         </p:txBody>
       </p:sp>
+      <p:sp>
+        <p:nvSpPr>
+          <p:cNvPr id="12" name="TextBox 11">
+            <a:extLst>
+              <a:ext uri="{FF2B5EF4-FFF2-40B4-BE49-F238E27FC236}">
+                <a16:creationId xmlns:a16="http://schemas.microsoft.com/office/drawing/2014/main" id="{AB5DE659-212D-2846-81C7-4EE6508BC8E0}"/>
+              </a:ext>
+            </a:extLst>
+          </p:cNvPr>
+          <p:cNvSpPr txBox="1"/>
+          <p:nvPr/>
+        </p:nvSpPr>
+        <p:spPr>
+          <a:xfrm>
+            <a:off x="556950" y="6066287"/>
+            <a:ext cx="6776535" cy="369332"/>
+          </a:xfrm>
+          <a:prstGeom prst="rect">
+            <a:avLst/>
+          </a:prstGeom>
+          <a:noFill/>
+        </p:spPr>
+        <p:txBody>
+          <a:bodyPr wrap="none" rtlCol="0">
+            <a:spAutoFit/>
+          </a:bodyPr>
+          <a:lstStyle/>
+          <a:p>
+            <a:r>
+              <a:rPr lang="it-IT" dirty="0"/>
+              <a:t>Note: </a:t>
+            </a:r>
+            <a:r>
+              <a:rPr lang="it-IT" dirty="0" err="1"/>
+              <a:t>through</a:t>
+            </a:r>
+            <a:r>
+              <a:rPr lang="it-IT" dirty="0"/>
+              <a:t> </a:t>
+            </a:r>
+            <a:r>
+              <a:rPr lang="it-IT" dirty="0" err="1"/>
+              <a:t>QuickPlot</a:t>
+            </a:r>
+            <a:r>
+              <a:rPr lang="it-IT" dirty="0"/>
+              <a:t> code </a:t>
+            </a:r>
+            <a:r>
+              <a:rPr lang="it-IT" dirty="0" err="1"/>
+              <a:t>you</a:t>
+            </a:r>
+            <a:r>
+              <a:rPr lang="it-IT" dirty="0"/>
+              <a:t> can </a:t>
+            </a:r>
+            <a:r>
+              <a:rPr lang="it-IT" dirty="0" err="1"/>
+              <a:t>make</a:t>
+            </a:r>
+            <a:r>
+              <a:rPr lang="it-IT" dirty="0"/>
+              <a:t> plots with </a:t>
+            </a:r>
+            <a:r>
+              <a:rPr lang="it-IT" dirty="0" err="1"/>
+              <a:t>thresholds</a:t>
+            </a:r>
+            <a:r>
+              <a:rPr lang="it-IT" dirty="0"/>
+              <a:t> </a:t>
+            </a:r>
+            <a:r>
+              <a:rPr lang="it-IT" dirty="0" err="1"/>
+              <a:t>lines</a:t>
+            </a:r>
+            <a:endParaRPr lang="it-IT" dirty="0"/>
+          </a:p>
+        </p:txBody>
+      </p:sp>
     </p:spTree>
     <p:extLst>
       <p:ext uri="{BB962C8B-B14F-4D97-AF65-F5344CB8AC3E}">
@@ -5500,8 +5581,8 @@
           <a:lstStyle/>
           <a:p>
             <a:pPr marL="285750" indent="-285750">
-              <a:buFont typeface="Arial" panose="020B0604020202020204" pitchFamily="34" charset="0"/>
-              <a:buChar char="•"/>
+              <a:buFont typeface="Wingdings" pitchFamily="2" charset="2"/>
+              <a:buChar char="§"/>
             </a:pPr>
             <a:r>
               <a:rPr lang="it-IT" dirty="0" err="1"/>
@@ -5522,8 +5603,8 @@
           </a:p>
           <a:p>
             <a:pPr marL="285750" indent="-285750">
-              <a:buFont typeface="Arial" panose="020B0604020202020204" pitchFamily="34" charset="0"/>
-              <a:buChar char="•"/>
+              <a:buFont typeface="Wingdings" pitchFamily="2" charset="2"/>
+              <a:buChar char="§"/>
             </a:pPr>
             <a:r>
               <a:rPr lang="it-IT" dirty="0"/>
@@ -5537,8 +5618,8 @@
           </a:p>
           <a:p>
             <a:pPr marL="285750" indent="-285750">
-              <a:buFont typeface="Arial" panose="020B0604020202020204" pitchFamily="34" charset="0"/>
-              <a:buChar char="•"/>
+              <a:buFont typeface="Wingdings" pitchFamily="2" charset="2"/>
+              <a:buChar char="§"/>
             </a:pPr>
             <a:r>
               <a:rPr lang="it-IT" dirty="0" err="1"/>
@@ -5825,8 +5906,8 @@
           <a:lstStyle/>
           <a:p>
             <a:pPr marL="285750" indent="-285750">
-              <a:buFont typeface="Arial" panose="020B0604020202020204" pitchFamily="34" charset="0"/>
-              <a:buChar char="•"/>
+              <a:buFont typeface="Wingdings" pitchFamily="2" charset="2"/>
+              <a:buChar char="§"/>
             </a:pPr>
             <a:r>
               <a:rPr lang="it-IT" dirty="0" err="1"/>
@@ -5847,8 +5928,8 @@
           </a:p>
           <a:p>
             <a:pPr marL="285750" indent="-285750">
-              <a:buFont typeface="Arial" panose="020B0604020202020204" pitchFamily="34" charset="0"/>
-              <a:buChar char="•"/>
+              <a:buFont typeface="Wingdings" pitchFamily="2" charset="2"/>
+              <a:buChar char="§"/>
             </a:pPr>
             <a:r>
               <a:rPr lang="it-IT" dirty="0"/>
@@ -5862,8 +5943,8 @@
           </a:p>
           <a:p>
             <a:pPr marL="285750" indent="-285750">
-              <a:buFont typeface="Arial" panose="020B0604020202020204" pitchFamily="34" charset="0"/>
-              <a:buChar char="•"/>
+              <a:buFont typeface="Wingdings" pitchFamily="2" charset="2"/>
+              <a:buChar char="§"/>
             </a:pPr>
             <a:r>
               <a:rPr lang="it-IT" dirty="0" err="1"/>
@@ -6186,8 +6267,8 @@
           <a:lstStyle/>
           <a:p>
             <a:pPr marL="285750" indent="-285750">
-              <a:buFont typeface="Arial" panose="020B0604020202020204" pitchFamily="34" charset="0"/>
-              <a:buChar char="•"/>
+              <a:buFont typeface="Wingdings" pitchFamily="2" charset="2"/>
+              <a:buChar char="§"/>
             </a:pPr>
             <a:r>
               <a:rPr lang="it-IT" dirty="0" err="1"/>
@@ -6546,8 +6627,8 @@
           <a:lstStyle/>
           <a:p>
             <a:pPr marL="285750" indent="-285750">
-              <a:buFont typeface="Arial" panose="020B0604020202020204" pitchFamily="34" charset="0"/>
-              <a:buChar char="•"/>
+              <a:buFont typeface="Wingdings" pitchFamily="2" charset="2"/>
+              <a:buChar char="§"/>
             </a:pPr>
             <a:r>
               <a:rPr lang="it-IT" dirty="0" err="1"/>
@@ -6568,8 +6649,8 @@
           </a:p>
           <a:p>
             <a:pPr marL="285750" indent="-285750">
-              <a:buFont typeface="Arial" panose="020B0604020202020204" pitchFamily="34" charset="0"/>
-              <a:buChar char="•"/>
+              <a:buFont typeface="Wingdings" pitchFamily="2" charset="2"/>
+              <a:buChar char="§"/>
             </a:pPr>
             <a:r>
               <a:rPr lang="it-IT" dirty="0"/>
@@ -6583,8 +6664,8 @@
           </a:p>
           <a:p>
             <a:pPr marL="285750" indent="-285750">
-              <a:buFont typeface="Arial" panose="020B0604020202020204" pitchFamily="34" charset="0"/>
-              <a:buChar char="•"/>
+              <a:buFont typeface="Wingdings" pitchFamily="2" charset="2"/>
+              <a:buChar char="§"/>
             </a:pPr>
             <a:r>
               <a:rPr lang="it-IT" dirty="0" err="1"/>
@@ -6970,7 +7051,7 @@
         <p:spPr>
           <a:xfrm>
             <a:off x="881951" y="1534108"/>
-            <a:ext cx="1588897" cy="369332"/>
+            <a:ext cx="1616148" cy="369332"/>
           </a:xfrm>
           <a:prstGeom prst="rect">
             <a:avLst/>
@@ -6984,8 +7065,8 @@
           <a:lstStyle/>
           <a:p>
             <a:pPr marL="285750" indent="-285750">
-              <a:buFont typeface="Arial" panose="020B0604020202020204" pitchFamily="34" charset="0"/>
-              <a:buChar char="•"/>
+              <a:buFont typeface="Wingdings" pitchFamily="2" charset="2"/>
+              <a:buChar char="§"/>
             </a:pPr>
             <a:r>
               <a:rPr lang="it-IT" dirty="0"/>
@@ -6997,7 +7078,7 @@
             </a:r>
             <a:r>
               <a:rPr lang="it-IT" dirty="0"/>
-              <a:t> = 2.0 v</a:t>
+              <a:t> = 2.0 V</a:t>
             </a:r>
           </a:p>
         </p:txBody>
@@ -7017,7 +7098,7 @@
         <p:spPr>
           <a:xfrm>
             <a:off x="9525000" y="1520181"/>
-            <a:ext cx="1562800" cy="369332"/>
+            <a:ext cx="1590051" cy="369332"/>
           </a:xfrm>
           <a:prstGeom prst="rect">
             <a:avLst/>
@@ -7031,8 +7112,8 @@
           <a:lstStyle/>
           <a:p>
             <a:pPr marL="285750" indent="-285750">
-              <a:buFont typeface="Arial" panose="020B0604020202020204" pitchFamily="34" charset="0"/>
-              <a:buChar char="•"/>
+              <a:buFont typeface="Wingdings" pitchFamily="2" charset="2"/>
+              <a:buChar char="§"/>
             </a:pPr>
             <a:r>
               <a:rPr lang="it-IT" dirty="0"/>
@@ -7044,7 +7125,7 @@
             </a:r>
             <a:r>
               <a:rPr lang="it-IT" dirty="0"/>
-              <a:t> = 2.0 v</a:t>
+              <a:t> = 1.7 V</a:t>
             </a:r>
           </a:p>
         </p:txBody>
@@ -7325,7 +7406,7 @@
         <p:spPr>
           <a:xfrm>
             <a:off x="881951" y="1534108"/>
-            <a:ext cx="1588897" cy="369332"/>
+            <a:ext cx="1616148" cy="369332"/>
           </a:xfrm>
           <a:prstGeom prst="rect">
             <a:avLst/>
@@ -7339,8 +7420,8 @@
           <a:lstStyle/>
           <a:p>
             <a:pPr marL="285750" indent="-285750">
-              <a:buFont typeface="Arial" panose="020B0604020202020204" pitchFamily="34" charset="0"/>
-              <a:buChar char="•"/>
+              <a:buFont typeface="Wingdings" pitchFamily="2" charset="2"/>
+              <a:buChar char="§"/>
             </a:pPr>
             <a:r>
               <a:rPr lang="it-IT" dirty="0"/>
@@ -7352,7 +7433,7 @@
             </a:r>
             <a:r>
               <a:rPr lang="it-IT" dirty="0"/>
-              <a:t> = 2.0 v</a:t>
+              <a:t> = 2.0 V</a:t>
             </a:r>
           </a:p>
         </p:txBody>
@@ -7372,7 +7453,7 @@
         <p:spPr>
           <a:xfrm>
             <a:off x="9525000" y="1520181"/>
-            <a:ext cx="1562800" cy="369332"/>
+            <a:ext cx="1590051" cy="369332"/>
           </a:xfrm>
           <a:prstGeom prst="rect">
             <a:avLst/>
@@ -7386,8 +7467,8 @@
           <a:lstStyle/>
           <a:p>
             <a:pPr marL="285750" indent="-285750">
-              <a:buFont typeface="Arial" panose="020B0604020202020204" pitchFamily="34" charset="0"/>
-              <a:buChar char="•"/>
+              <a:buFont typeface="Wingdings" pitchFamily="2" charset="2"/>
+              <a:buChar char="§"/>
             </a:pPr>
             <a:r>
               <a:rPr lang="it-IT" dirty="0"/>
@@ -7399,7 +7480,7 @@
             </a:r>
             <a:r>
               <a:rPr lang="it-IT" dirty="0"/>
-              <a:t> = 2.0 v</a:t>
+              <a:t> = 1.7 V</a:t>
             </a:r>
           </a:p>
         </p:txBody>
@@ -7490,6 +7571,369 @@
 </file>
 
 <file path=ppt/slides/slide18.xml><?xml version="1.0" encoding="utf-8"?>
+<p:sld xmlns:a="http://schemas.openxmlformats.org/drawingml/2006/main" xmlns:r="http://schemas.openxmlformats.org/officeDocument/2006/relationships" xmlns:p="http://schemas.openxmlformats.org/presentationml/2006/main">
+  <p:cSld>
+    <p:spTree>
+      <p:nvGrpSpPr>
+        <p:cNvPr id="1" name=""/>
+        <p:cNvGrpSpPr/>
+        <p:nvPr/>
+      </p:nvGrpSpPr>
+      <p:grpSpPr>
+        <a:xfrm>
+          <a:off x="0" y="0"/>
+          <a:ext cx="0" cy="0"/>
+          <a:chOff x="0" y="0"/>
+          <a:chExt cx="0" cy="0"/>
+        </a:xfrm>
+      </p:grpSpPr>
+      <p:sp>
+        <p:nvSpPr>
+          <p:cNvPr id="2" name="Title 1">
+            <a:extLst>
+              <a:ext uri="{FF2B5EF4-FFF2-40B4-BE49-F238E27FC236}">
+                <a16:creationId xmlns:a16="http://schemas.microsoft.com/office/drawing/2014/main" id="{6B82FE63-5413-2D43-A916-67864D4110F7}"/>
+              </a:ext>
+            </a:extLst>
+          </p:cNvPr>
+          <p:cNvSpPr>
+            <a:spLocks noGrp="1"/>
+          </p:cNvSpPr>
+          <p:nvPr>
+            <p:ph type="title"/>
+          </p:nvPr>
+        </p:nvSpPr>
+        <p:spPr>
+          <a:xfrm>
+            <a:off x="685800" y="-124090"/>
+            <a:ext cx="10772775" cy="1658198"/>
+          </a:xfrm>
+        </p:spPr>
+        <p:txBody>
+          <a:bodyPr>
+            <a:normAutofit/>
+          </a:bodyPr>
+          <a:lstStyle/>
+          <a:p>
+            <a:pPr algn="ctr"/>
+            <a:r>
+              <a:rPr lang="it-IT" sz="4400"/>
+              <a:t>Conclusions and possible improvements</a:t>
+            </a:r>
+            <a:endParaRPr lang="it-IT" sz="4400" dirty="0"/>
+          </a:p>
+        </p:txBody>
+      </p:sp>
+      <p:sp>
+        <p:nvSpPr>
+          <p:cNvPr id="4" name="Footer Placeholder 3">
+            <a:extLst>
+              <a:ext uri="{FF2B5EF4-FFF2-40B4-BE49-F238E27FC236}">
+                <a16:creationId xmlns:a16="http://schemas.microsoft.com/office/drawing/2014/main" id="{05830F60-9A23-A449-8C2E-B0F9AA9785CE}"/>
+              </a:ext>
+            </a:extLst>
+          </p:cNvPr>
+          <p:cNvSpPr>
+            <a:spLocks noGrp="1"/>
+          </p:cNvSpPr>
+          <p:nvPr>
+            <p:ph type="ftr" sz="quarter" idx="11"/>
+          </p:nvPr>
+        </p:nvSpPr>
+        <p:spPr/>
+        <p:txBody>
+          <a:bodyPr/>
+          <a:lstStyle/>
+          <a:p>
+            <a:r>
+              <a:rPr lang="en-US"/>
+              <a:t>Niccolò Ciavarelli, Alessandro Mancini</a:t>
+            </a:r>
+          </a:p>
+        </p:txBody>
+      </p:sp>
+      <p:sp>
+        <p:nvSpPr>
+          <p:cNvPr id="5" name="Slide Number Placeholder 4">
+            <a:extLst>
+              <a:ext uri="{FF2B5EF4-FFF2-40B4-BE49-F238E27FC236}">
+                <a16:creationId xmlns:a16="http://schemas.microsoft.com/office/drawing/2014/main" id="{3DFFEF5F-1EE7-9F47-A55D-9EE5C30A9D08}"/>
+              </a:ext>
+            </a:extLst>
+          </p:cNvPr>
+          <p:cNvSpPr>
+            <a:spLocks noGrp="1"/>
+          </p:cNvSpPr>
+          <p:nvPr>
+            <p:ph type="sldNum" sz="quarter" idx="12"/>
+          </p:nvPr>
+        </p:nvSpPr>
+        <p:spPr/>
+        <p:txBody>
+          <a:bodyPr/>
+          <a:lstStyle/>
+          <a:p>
+            <a:fld id="{ABE17D80-2DC1-4B61-A42F-CD3D496E699C}" type="slidenum">
+              <a:rPr lang="en-US" smtClean="0"/>
+              <a:t>18</a:t>
+            </a:fld>
+            <a:endParaRPr lang="en-US"/>
+          </a:p>
+        </p:txBody>
+      </p:sp>
+      <mc:AlternateContent xmlns:mc="http://schemas.openxmlformats.org/markup-compatibility/2006" xmlns:a14="http://schemas.microsoft.com/office/drawing/2010/main">
+        <mc:Choice Requires="a14">
+          <p:sp>
+            <p:nvSpPr>
+              <p:cNvPr id="7" name="CasellaDiTesto 6"/>
+              <p:cNvSpPr txBox="1"/>
+              <p:nvPr/>
+            </p:nvSpPr>
+            <p:spPr>
+              <a:xfrm>
+                <a:off x="685800" y="1410789"/>
+                <a:ext cx="10772775" cy="3447098"/>
+              </a:xfrm>
+              <a:prstGeom prst="rect">
+                <a:avLst/>
+              </a:prstGeom>
+              <a:noFill/>
+            </p:spPr>
+            <p:txBody>
+              <a:bodyPr wrap="square" rtlCol="0">
+                <a:spAutoFit/>
+              </a:bodyPr>
+              <a:lstStyle/>
+              <a:p>
+                <a:r>
+                  <a:rPr lang="it-IT" sz="2000"/>
+                  <a:t>Conclusions:</a:t>
+                </a:r>
+              </a:p>
+              <a:p>
+                <a:pPr marL="285750" indent="-285750">
+                  <a:buFont typeface="Wingdings" panose="05000000000000000000" pitchFamily="2" charset="2"/>
+                  <a:buChar char="§"/>
+                </a:pPr>
+                <a:r>
+                  <a:rPr lang="it-IT" sz="2000"/>
+                  <a:t>the system has always been able to bring the voltage back to the safe zone </a:t>
+                </a:r>
+                <a14:m>
+                  <m:oMath xmlns:m="http://schemas.openxmlformats.org/officeDocument/2006/math">
+                    <m:r>
+                      <a:rPr lang="it-IT" sz="2000" b="0" i="0" smtClean="0">
+                        <a:latin typeface="Cambria Math" panose="02040503050406030204" pitchFamily="18" charset="0"/>
+                      </a:rPr>
+                      <m:t>[</m:t>
+                    </m:r>
+                    <m:sSub>
+                      <m:sSubPr>
+                        <m:ctrlPr>
+                          <a:rPr lang="it-IT" sz="2000" i="1" smtClean="0">
+                            <a:latin typeface="Cambria Math" panose="02040503050406030204" pitchFamily="18" charset="0"/>
+                          </a:rPr>
+                        </m:ctrlPr>
+                      </m:sSubPr>
+                      <m:e>
+                        <m:r>
+                          <m:rPr>
+                            <m:sty m:val="p"/>
+                          </m:rPr>
+                          <a:rPr lang="it-IT" sz="2000" b="0" i="0" smtClean="0">
+                            <a:latin typeface="Cambria Math" panose="02040503050406030204" pitchFamily="18" charset="0"/>
+                          </a:rPr>
+                          <m:t>V</m:t>
+                        </m:r>
+                      </m:e>
+                      <m:sub>
+                        <m:r>
+                          <m:rPr>
+                            <m:sty m:val="p"/>
+                          </m:rPr>
+                          <a:rPr lang="it-IT" sz="2000" b="0" i="0" smtClean="0">
+                            <a:latin typeface="Cambria Math" panose="02040503050406030204" pitchFamily="18" charset="0"/>
+                          </a:rPr>
+                          <m:t>LOW</m:t>
+                        </m:r>
+                      </m:sub>
+                    </m:sSub>
+                    <m:r>
+                      <a:rPr lang="it-IT" sz="2000" b="0" i="0" smtClean="0">
+                        <a:latin typeface="Cambria Math" panose="02040503050406030204" pitchFamily="18" charset="0"/>
+                      </a:rPr>
+                      <m:t>,</m:t>
+                    </m:r>
+                    <m:sSub>
+                      <m:sSubPr>
+                        <m:ctrlPr>
+                          <a:rPr lang="it-IT" sz="2000" i="1" smtClean="0">
+                            <a:latin typeface="Cambria Math" panose="02040503050406030204" pitchFamily="18" charset="0"/>
+                          </a:rPr>
+                        </m:ctrlPr>
+                      </m:sSubPr>
+                      <m:e>
+                        <m:r>
+                          <m:rPr>
+                            <m:sty m:val="p"/>
+                          </m:rPr>
+                          <a:rPr lang="it-IT" sz="2000" b="0" i="0" smtClean="0">
+                            <a:latin typeface="Cambria Math" panose="02040503050406030204" pitchFamily="18" charset="0"/>
+                          </a:rPr>
+                          <m:t>V</m:t>
+                        </m:r>
+                      </m:e>
+                      <m:sub>
+                        <m:r>
+                          <m:rPr>
+                            <m:sty m:val="p"/>
+                          </m:rPr>
+                          <a:rPr lang="it-IT" sz="2000" b="0" i="0" smtClean="0">
+                            <a:latin typeface="Cambria Math" panose="02040503050406030204" pitchFamily="18" charset="0"/>
+                          </a:rPr>
+                          <m:t>HIGH</m:t>
+                        </m:r>
+                      </m:sub>
+                    </m:sSub>
+                    <m:r>
+                      <a:rPr lang="it-IT" sz="2000" b="0" i="0" smtClean="0">
+                        <a:latin typeface="Cambria Math" panose="02040503050406030204" pitchFamily="18" charset="0"/>
+                      </a:rPr>
+                      <m:t>]</m:t>
+                    </m:r>
+                  </m:oMath>
+                </a14:m>
+                <a:r>
+                  <a:rPr lang="en-US" sz="2000"/>
+                  <a:t>;</a:t>
+                </a:r>
+              </a:p>
+              <a:p>
+                <a:pPr marL="285750" indent="-285750">
+                  <a:buFont typeface="Wingdings" panose="05000000000000000000" pitchFamily="2" charset="2"/>
+                  <a:buChar char="§"/>
+                </a:pPr>
+                <a:r>
+                  <a:rPr lang="it-IT" sz="2000"/>
+                  <a:t>the salt water insertion showed a much greater effect, resulting in sharp vertical peaks, while tap water needed to be inserted multiple times;</a:t>
+                </a:r>
+              </a:p>
+              <a:p>
+                <a:pPr marL="285750" indent="-285750">
+                  <a:buFont typeface="Wingdings" panose="05000000000000000000" pitchFamily="2" charset="2"/>
+                  <a:buChar char="§"/>
+                </a:pPr>
+                <a:r>
+                  <a:rPr lang="it-IT" sz="2000"/>
+                  <a:t>the offset problem surely plays a role especially when the voltage is close to the thresholds;</a:t>
+                </a:r>
+              </a:p>
+              <a:p>
+                <a:pPr marL="285750" indent="-285750">
+                  <a:buFont typeface="Wingdings" panose="05000000000000000000" pitchFamily="2" charset="2"/>
+                  <a:buChar char="§"/>
+                </a:pPr>
+                <a:r>
+                  <a:rPr lang="it-IT" sz="2000"/>
+                  <a:t>the system can approximately represent a pancreas with certain limitations.</a:t>
+                </a:r>
+              </a:p>
+              <a:p>
+                <a:endParaRPr lang="it-IT" sz="2000"/>
+              </a:p>
+              <a:p>
+                <a:r>
+                  <a:rPr lang="it-IT" sz="2000"/>
+                  <a:t>Possible improvements:</a:t>
+                </a:r>
+              </a:p>
+              <a:p>
+                <a:pPr marL="285750" indent="-285750">
+                  <a:buFont typeface="Wingdings" panose="05000000000000000000" pitchFamily="2" charset="2"/>
+                  <a:buChar char="§"/>
+                </a:pPr>
+                <a:r>
+                  <a:rPr lang="it-IT" sz="2000"/>
+                  <a:t>a bigger water container could be used;</a:t>
+                </a:r>
+              </a:p>
+              <a:p>
+                <a:pPr marL="285750" indent="-285750">
+                  <a:buFont typeface="Wingdings" panose="05000000000000000000" pitchFamily="2" charset="2"/>
+                  <a:buChar char="§"/>
+                </a:pPr>
+                <a:r>
+                  <a:rPr lang="it-IT" sz="2000"/>
+                  <a:t>the pumps could be installed further from the sensor, to avoid the sharp peaks;</a:t>
+                </a:r>
+              </a:p>
+              <a:p>
+                <a:pPr marL="285750" indent="-285750">
+                  <a:buFont typeface="Wingdings" panose="05000000000000000000" pitchFamily="2" charset="2"/>
+                  <a:buChar char="§"/>
+                </a:pPr>
+                <a:r>
+                  <a:rPr lang="it-IT" sz="2000"/>
+                  <a:t>the offset problem should be properly treated and solved, either by means of hardware or software.</a:t>
+                </a:r>
+                <a:endParaRPr lang="en-US" sz="2000"/>
+              </a:p>
+            </p:txBody>
+          </p:sp>
+        </mc:Choice>
+        <mc:Fallback xmlns="">
+          <p:sp>
+            <p:nvSpPr>
+              <p:cNvPr id="7" name="CasellaDiTesto 6"/>
+              <p:cNvSpPr txBox="1">
+                <a:spLocks noRot="1" noChangeAspect="1" noMove="1" noResize="1" noEditPoints="1" noAdjustHandles="1" noChangeArrowheads="1" noChangeShapeType="1" noTextEdit="1"/>
+              </p:cNvSpPr>
+              <p:nvPr/>
+            </p:nvSpPr>
+            <p:spPr>
+              <a:xfrm>
+                <a:off x="685800" y="1410789"/>
+                <a:ext cx="10772775" cy="3447098"/>
+              </a:xfrm>
+              <a:prstGeom prst="rect">
+                <a:avLst/>
+              </a:prstGeom>
+              <a:blipFill>
+                <a:blip r:embed="rId2"/>
+                <a:stretch>
+                  <a:fillRect l="-623" t="-883" b="-3004"/>
+                </a:stretch>
+              </a:blipFill>
+            </p:spPr>
+            <p:txBody>
+              <a:bodyPr/>
+              <a:lstStyle/>
+              <a:p>
+                <a:r>
+                  <a:rPr lang="en-US">
+                    <a:noFill/>
+                  </a:rPr>
+                  <a:t> </a:t>
+                </a:r>
+              </a:p>
+            </p:txBody>
+          </p:sp>
+        </mc:Fallback>
+      </mc:AlternateContent>
+    </p:spTree>
+    <p:extLst>
+      <p:ext uri="{BB962C8B-B14F-4D97-AF65-F5344CB8AC3E}">
+        <p14:creationId xmlns:p14="http://schemas.microsoft.com/office/powerpoint/2010/main" val="3902478964"/>
+      </p:ext>
+    </p:extLst>
+  </p:cSld>
+  <p:clrMapOvr>
+    <a:masterClrMapping/>
+  </p:clrMapOvr>
+</p:sld>
+</file>
+
+<file path=ppt/slides/slide19.xml><?xml version="1.0" encoding="utf-8"?>
 <p:sld xmlns:a="http://schemas.openxmlformats.org/drawingml/2006/main" xmlns:r="http://schemas.openxmlformats.org/officeDocument/2006/relationships" xmlns:p="http://schemas.openxmlformats.org/presentationml/2006/main">
   <p:cSld>
     <p:spTree>

</xml_diff>